<commit_message>
Modify typo and bugs in ppt
</commit_message>
<xml_diff>
--- a/docs/brainpy_handbook/ppt/neus.pptx
+++ b/docs/brainpy_handbook/ppt/neus.pptx
@@ -5684,7 +5684,7 @@
           <a:p>
             <a:r>
               <a:rPr lang="en-US" altLang="zh-CN" sz="2000" dirty="0"/>
-              <a:t>in vector form.</a:t>
+              <a:t>one by one.</a:t>
             </a:r>
             <a:endParaRPr lang="zh-CN" altLang="en-US" sz="2000" dirty="0"/>
           </a:p>
@@ -6885,50 +6885,6 @@
           </p:sp>
         </mc:Fallback>
       </mc:AlternateContent>
-      <p:sp>
-        <p:nvSpPr>
-          <p:cNvPr id="28" name="右大括号 27">
-            <a:extLst>
-              <a:ext uri="{FF2B5EF4-FFF2-40B4-BE49-F238E27FC236}">
-                <a16:creationId xmlns:a16="http://schemas.microsoft.com/office/drawing/2014/main" id="{93BC3FD9-20A0-4DE5-A043-F26285DB854F}"/>
-              </a:ext>
-            </a:extLst>
-          </p:cNvPr>
-          <p:cNvSpPr/>
-          <p:nvPr/>
-        </p:nvSpPr>
-        <p:spPr>
-          <a:xfrm>
-            <a:off x="7442090" y="3361277"/>
-            <a:ext cx="216000" cy="796901"/>
-          </a:xfrm>
-          <a:prstGeom prst="rightBrace">
-            <a:avLst/>
-          </a:prstGeom>
-        </p:spPr>
-        <p:style>
-          <a:lnRef idx="1">
-            <a:schemeClr val="dk1"/>
-          </a:lnRef>
-          <a:fillRef idx="0">
-            <a:schemeClr val="dk1"/>
-          </a:fillRef>
-          <a:effectRef idx="0">
-            <a:schemeClr val="dk1"/>
-          </a:effectRef>
-          <a:fontRef idx="minor">
-            <a:schemeClr val="tx1"/>
-          </a:fontRef>
-        </p:style>
-        <p:txBody>
-          <a:bodyPr rtlCol="0" anchor="ctr"/>
-          <a:lstStyle/>
-          <a:p>
-            <a:pPr algn="ctr"/>
-            <a:endParaRPr lang="zh-CN" altLang="en-US" sz="7200"/>
-          </a:p>
-        </p:txBody>
-      </p:sp>
       <p:cxnSp>
         <p:nvCxnSpPr>
           <p:cNvPr id="29" name="直接箭头连接符 28">
@@ -7210,8 +7166,8 @@
           </a:p>
         </p:txBody>
       </p:sp>
-      <mc:AlternateContent xmlns:mc="http://schemas.openxmlformats.org/markup-compatibility/2006" xmlns:a14="http://schemas.microsoft.com/office/drawing/2010/main">
-        <mc:Choice Requires="a14">
+      <mc:AlternateContent xmlns:mc="http://schemas.openxmlformats.org/markup-compatibility/2006">
+        <mc:Choice xmlns:a14="http://schemas.microsoft.com/office/drawing/2010/main" Requires="a14">
           <p:sp>
             <p:nvSpPr>
               <p:cNvPr id="7" name="文本框 6">
@@ -7226,7 +7182,7 @@
             </p:nvSpPr>
             <p:spPr>
               <a:xfrm>
-                <a:off x="9101918" y="3913792"/>
+                <a:off x="9101918" y="3964592"/>
                 <a:ext cx="2734482" cy="307777"/>
               </a:xfrm>
               <a:prstGeom prst="rect">
@@ -7354,7 +7310,7 @@
             </p:txBody>
           </p:sp>
         </mc:Choice>
-        <mc:Fallback xmlns="">
+        <mc:Fallback>
           <p:sp>
             <p:nvSpPr>
               <p:cNvPr id="7" name="文本框 6">
@@ -7371,7 +7327,7 @@
             </p:nvSpPr>
             <p:spPr>
               <a:xfrm>
-                <a:off x="9101918" y="3913792"/>
+                <a:off x="9101918" y="3964592"/>
                 <a:ext cx="2734482" cy="307777"/>
               </a:xfrm>
               <a:prstGeom prst="rect">
@@ -7747,8 +7703,8 @@
           </a:fontRef>
         </p:style>
       </p:cxnSp>
-      <mc:AlternateContent xmlns:mc="http://schemas.openxmlformats.org/markup-compatibility/2006" xmlns:a14="http://schemas.microsoft.com/office/drawing/2010/main">
-        <mc:Choice Requires="a14">
+      <mc:AlternateContent xmlns:mc="http://schemas.openxmlformats.org/markup-compatibility/2006">
+        <mc:Choice xmlns:a14="http://schemas.microsoft.com/office/drawing/2010/main" Requires="a14">
           <p:sp>
             <p:nvSpPr>
               <p:cNvPr id="17" name="文本框 16">
@@ -7763,7 +7719,7 @@
             </p:nvSpPr>
             <p:spPr>
               <a:xfrm>
-                <a:off x="9101918" y="4604245"/>
+                <a:off x="9101918" y="4667745"/>
                 <a:ext cx="4489109" cy="337721"/>
               </a:xfrm>
               <a:prstGeom prst="rect">
@@ -7994,7 +7950,7 @@
             </p:txBody>
           </p:sp>
         </mc:Choice>
-        <mc:Fallback xmlns="">
+        <mc:Fallback>
           <p:sp>
             <p:nvSpPr>
               <p:cNvPr id="17" name="文本框 16">
@@ -8011,7 +7967,7 @@
             </p:nvSpPr>
             <p:spPr>
               <a:xfrm>
-                <a:off x="9101918" y="4604245"/>
+                <a:off x="9101918" y="4667745"/>
                 <a:ext cx="4489109" cy="337721"/>
               </a:xfrm>
               <a:prstGeom prst="rect">
@@ -8020,7 +7976,7 @@
               <a:blipFill>
                 <a:blip r:embed="rId4"/>
                 <a:stretch>
-                  <a:fillRect l="-2038" r="-2446" b="-23214"/>
+                  <a:fillRect l="-2038" t="-1818" r="-2446" b="-25455"/>
                 </a:stretch>
               </a:blipFill>
             </p:spPr>
@@ -8039,8 +7995,8 @@
           </p:sp>
         </mc:Fallback>
       </mc:AlternateContent>
-      <mc:AlternateContent xmlns:mc="http://schemas.openxmlformats.org/markup-compatibility/2006" xmlns:a14="http://schemas.microsoft.com/office/drawing/2010/main">
-        <mc:Choice Requires="a14">
+      <mc:AlternateContent xmlns:mc="http://schemas.openxmlformats.org/markup-compatibility/2006">
+        <mc:Choice xmlns:a14="http://schemas.microsoft.com/office/drawing/2010/main" Requires="a14">
           <p:sp>
             <p:nvSpPr>
               <p:cNvPr id="20" name="文本框 19">
@@ -8055,7 +8011,7 @@
             </p:nvSpPr>
             <p:spPr>
               <a:xfrm>
-                <a:off x="9101918" y="4256550"/>
+                <a:off x="9101918" y="4307350"/>
                 <a:ext cx="2734483" cy="307777"/>
               </a:xfrm>
               <a:prstGeom prst="rect">
@@ -8183,7 +8139,7 @@
             </p:txBody>
           </p:sp>
         </mc:Choice>
-        <mc:Fallback xmlns="">
+        <mc:Fallback>
           <p:sp>
             <p:nvSpPr>
               <p:cNvPr id="20" name="文本框 19">
@@ -8200,7 +8156,7 @@
             </p:nvSpPr>
             <p:spPr>
               <a:xfrm>
-                <a:off x="9101918" y="4256550"/>
+                <a:off x="9101918" y="4307350"/>
                 <a:ext cx="2734483" cy="307777"/>
               </a:xfrm>
               <a:prstGeom prst="rect">
@@ -8209,7 +8165,7 @@
               <a:blipFill>
                 <a:blip r:embed="rId5"/>
                 <a:stretch>
-                  <a:fillRect l="-3341" b="-33333"/>
+                  <a:fillRect l="-3341" b="-34000"/>
                 </a:stretch>
               </a:blipFill>
             </p:spPr>
@@ -8228,8 +8184,8 @@
           </p:sp>
         </mc:Fallback>
       </mc:AlternateContent>
-      <mc:AlternateContent xmlns:mc="http://schemas.openxmlformats.org/markup-compatibility/2006" xmlns:a14="http://schemas.microsoft.com/office/drawing/2010/main">
-        <mc:Choice Requires="a14">
+      <mc:AlternateContent xmlns:mc="http://schemas.openxmlformats.org/markup-compatibility/2006">
+        <mc:Choice xmlns:a14="http://schemas.microsoft.com/office/drawing/2010/main" Requires="a14">
           <p:sp>
             <p:nvSpPr>
               <p:cNvPr id="21" name="文本框 20">
@@ -8244,8 +8200,8 @@
             </p:nvSpPr>
             <p:spPr>
               <a:xfrm>
-                <a:off x="9101918" y="4932874"/>
-                <a:ext cx="4489109" cy="584327"/>
+                <a:off x="9101918" y="5034474"/>
+                <a:ext cx="4489109" cy="640240"/>
               </a:xfrm>
               <a:prstGeom prst="rect">
                 <a:avLst/>
@@ -8260,171 +8216,193 @@
               <a:p>
                 <a:pPr/>
                 <a14:m>
+                  <m:oMath xmlns:m="http://schemas.openxmlformats.org/officeDocument/2006/math">
+                    <m:r>
+                      <m:rPr>
+                        <m:sty m:val="p"/>
+                      </m:rPr>
+                      <a:rPr lang="el-GR" altLang="zh-CN" sz="2000" b="0" i="1" smtClean="0">
+                        <a:latin typeface="Cambria Math" panose="02040503050406030204" pitchFamily="18" charset="0"/>
+                      </a:rPr>
+                      <m:t>τ</m:t>
+                    </m:r>
+                    <m:r>
+                      <a:rPr lang="en-US" altLang="zh-CN" sz="2000" b="0" i="1" smtClean="0">
+                        <a:latin typeface="Cambria Math" panose="02040503050406030204" pitchFamily="18" charset="0"/>
+                      </a:rPr>
+                      <m:t>𝑑𝑉</m:t>
+                    </m:r>
+                    <m:r>
+                      <a:rPr lang="en-US" altLang="zh-CN" sz="2000" b="0" i="1" smtClean="0">
+                        <a:latin typeface="Cambria Math" panose="02040503050406030204" pitchFamily="18" charset="0"/>
+                      </a:rPr>
+                      <m:t>/</m:t>
+                    </m:r>
+                    <m:r>
+                      <a:rPr lang="en-US" altLang="zh-CN" sz="2000" b="0" i="1" smtClean="0">
+                        <a:latin typeface="Cambria Math" panose="02040503050406030204" pitchFamily="18" charset="0"/>
+                      </a:rPr>
+                      <m:t>𝑑𝑡</m:t>
+                    </m:r>
+                    <m:r>
+                      <a:rPr lang="en-US" altLang="zh-CN" sz="2000" b="0" i="1" smtClean="0">
+                        <a:latin typeface="Cambria Math" panose="02040503050406030204" pitchFamily="18" charset="0"/>
+                      </a:rPr>
+                      <m:t>=−</m:t>
+                    </m:r>
+                    <m:d>
+                      <m:dPr>
+                        <m:ctrlPr>
+                          <a:rPr lang="en-US" altLang="zh-CN" sz="2000" b="0" i="1" smtClean="0">
+                            <a:latin typeface="Cambria Math" panose="02040503050406030204" pitchFamily="18" charset="0"/>
+                          </a:rPr>
+                        </m:ctrlPr>
+                      </m:dPr>
+                      <m:e>
+                        <m:r>
+                          <a:rPr lang="en-US" altLang="zh-CN" sz="2000" b="0" i="1" smtClean="0">
+                            <a:latin typeface="Cambria Math" panose="02040503050406030204" pitchFamily="18" charset="0"/>
+                          </a:rPr>
+                          <m:t>𝑉</m:t>
+                        </m:r>
+                        <m:r>
+                          <a:rPr lang="en-US" altLang="zh-CN" sz="2000" b="0" i="1" smtClean="0">
+                            <a:latin typeface="Cambria Math" panose="02040503050406030204" pitchFamily="18" charset="0"/>
+                          </a:rPr>
+                          <m:t> −</m:t>
+                        </m:r>
+                        <m:sSub>
+                          <m:sSubPr>
+                            <m:ctrlPr>
+                              <a:rPr lang="en-US" altLang="zh-CN" sz="2000" b="0" i="1" smtClean="0">
+                                <a:latin typeface="Cambria Math" panose="02040503050406030204" pitchFamily="18" charset="0"/>
+                              </a:rPr>
+                            </m:ctrlPr>
+                          </m:sSubPr>
+                          <m:e>
+                            <m:r>
+                              <a:rPr lang="en-US" altLang="zh-CN" sz="2000" b="0" i="1" smtClean="0">
+                                <a:latin typeface="Cambria Math" panose="02040503050406030204" pitchFamily="18" charset="0"/>
+                              </a:rPr>
+                              <m:t>𝑉</m:t>
+                            </m:r>
+                          </m:e>
+                          <m:sub>
+                            <m:r>
+                              <a:rPr lang="en-US" altLang="zh-CN" sz="2000" b="0" i="1" smtClean="0">
+                                <a:latin typeface="Cambria Math" panose="02040503050406030204" pitchFamily="18" charset="0"/>
+                              </a:rPr>
+                              <m:t>𝑟𝑒𝑠𝑡</m:t>
+                            </m:r>
+                          </m:sub>
+                        </m:sSub>
+                      </m:e>
+                    </m:d>
+                    <m:r>
+                      <a:rPr lang="en-US" altLang="zh-CN" sz="2000" b="0" i="1" smtClean="0">
+                        <a:latin typeface="Cambria Math" panose="02040503050406030204" pitchFamily="18" charset="0"/>
+                      </a:rPr>
+                      <m:t>+</m:t>
+                    </m:r>
+                    <m:r>
+                      <a:rPr lang="en-US" altLang="zh-CN" sz="2000" b="0" i="1" smtClean="0">
+                        <a:latin typeface="Cambria Math" panose="02040503050406030204" pitchFamily="18" charset="0"/>
+                      </a:rPr>
+                      <m:t>𝑅</m:t>
+                    </m:r>
+                    <m:r>
+                      <a:rPr lang="en-US" altLang="zh-CN" sz="2000" b="0" i="1" smtClean="0">
+                        <a:latin typeface="Cambria Math" panose="02040503050406030204" pitchFamily="18" charset="0"/>
+                      </a:rPr>
+                      <m:t>∑</m:t>
+                    </m:r>
+                    <m:sSub>
+                      <m:sSubPr>
+                        <m:ctrlPr>
+                          <a:rPr lang="en-US" altLang="zh-CN" sz="2000" b="0" i="1" smtClean="0">
+                            <a:latin typeface="Cambria Math" panose="02040503050406030204" pitchFamily="18" charset="0"/>
+                          </a:rPr>
+                        </m:ctrlPr>
+                      </m:sSubPr>
+                      <m:e>
+                        <m:r>
+                          <a:rPr lang="en-US" altLang="zh-CN" sz="2000" b="0" i="1" smtClean="0">
+                            <a:latin typeface="Cambria Math" panose="02040503050406030204" pitchFamily="18" charset="0"/>
+                          </a:rPr>
+                          <m:t>𝐼</m:t>
+                        </m:r>
+                      </m:e>
+                      <m:sub>
+                        <m:r>
+                          <a:rPr lang="en-US" altLang="zh-CN" sz="2000" b="0" i="1" smtClean="0">
+                            <a:latin typeface="Cambria Math" panose="02040503050406030204" pitchFamily="18" charset="0"/>
+                          </a:rPr>
+                          <m:t>𝑗</m:t>
+                        </m:r>
+                      </m:sub>
+                    </m:sSub>
+                    <m:r>
+                      <a:rPr lang="en-US" altLang="zh-CN" sz="2000" b="0" i="1" smtClean="0">
+                        <a:latin typeface="Cambria Math" panose="02040503050406030204" pitchFamily="18" charset="0"/>
+                      </a:rPr>
+                      <m:t>+</m:t>
+                    </m:r>
+                    <m:r>
+                      <a:rPr lang="en-US" altLang="zh-CN" sz="2000" b="0" i="1" smtClean="0">
+                        <a:latin typeface="Cambria Math" panose="02040503050406030204" pitchFamily="18" charset="0"/>
+                      </a:rPr>
+                      <m:t>𝑅𝐼</m:t>
+                    </m:r>
+                    <m:r>
+                      <a:rPr lang="en-US" altLang="zh-CN" sz="2000" b="0" i="1" smtClean="0">
+                        <a:latin typeface="Cambria Math" panose="02040503050406030204" pitchFamily="18" charset="0"/>
+                      </a:rPr>
+                      <m:t>(</m:t>
+                    </m:r>
+                    <m:r>
+                      <a:rPr lang="en-US" altLang="zh-CN" sz="2000" b="0" i="1" smtClean="0">
+                        <a:latin typeface="Cambria Math" panose="02040503050406030204" pitchFamily="18" charset="0"/>
+                      </a:rPr>
+                      <m:t>𝑡</m:t>
+                    </m:r>
+                    <m:r>
+                      <a:rPr lang="en-US" altLang="zh-CN" sz="2000" b="0" i="1" smtClean="0">
+                        <a:latin typeface="Cambria Math" panose="02040503050406030204" pitchFamily="18" charset="0"/>
+                      </a:rPr>
+                      <m:t>)</m:t>
+                    </m:r>
+                  </m:oMath>
+                </a14:m>
+                <a:r>
+                  <a:rPr lang="en-US" altLang="zh-CN" sz="2000" dirty="0"/>
+                  <a:t>,</a:t>
+                </a:r>
+              </a:p>
+              <a:p>
+                <a:pPr/>
+                <a14:m>
                   <m:oMathPara xmlns:m="http://schemas.openxmlformats.org/officeDocument/2006/math">
                     <m:oMathParaPr>
-                      <m:jc m:val="left"/>
+                      <m:jc m:val="right"/>
                     </m:oMathParaPr>
                     <m:oMath xmlns:m="http://schemas.openxmlformats.org/officeDocument/2006/math">
                       <m:r>
-                        <m:rPr>
-                          <m:sty m:val="p"/>
-                        </m:rPr>
-                        <a:rPr lang="el-GR" altLang="zh-CN" sz="2000" b="0" i="1" smtClean="0">
-                          <a:latin typeface="Cambria Math" panose="02040503050406030204" pitchFamily="18" charset="0"/>
-                        </a:rPr>
-                        <m:t>τ</m:t>
-                      </m:r>
-                      <m:f>
-                        <m:fPr>
-                          <m:ctrlPr>
-                            <a:rPr lang="en-US" altLang="zh-CN" sz="2000" b="0" i="1" smtClean="0">
-                              <a:latin typeface="Cambria Math" panose="02040503050406030204" pitchFamily="18" charset="0"/>
-                            </a:rPr>
-                          </m:ctrlPr>
-                        </m:fPr>
-                        <m:num>
-                          <m:r>
-                            <a:rPr lang="en-US" altLang="zh-CN" sz="2000" b="0" i="1" smtClean="0">
-                              <a:latin typeface="Cambria Math" panose="02040503050406030204" pitchFamily="18" charset="0"/>
-                            </a:rPr>
-                            <m:t>𝑑𝑉</m:t>
-                          </m:r>
-                        </m:num>
-                        <m:den>
-                          <m:r>
-                            <a:rPr lang="en-US" altLang="zh-CN" sz="2000" b="0" i="1" smtClean="0">
-                              <a:latin typeface="Cambria Math" panose="02040503050406030204" pitchFamily="18" charset="0"/>
-                            </a:rPr>
-                            <m:t>𝑑𝑡</m:t>
-                          </m:r>
-                        </m:den>
-                      </m:f>
-                      <m:r>
-                        <a:rPr lang="en-US" altLang="zh-CN" sz="2000" b="0" i="1" smtClean="0">
-                          <a:latin typeface="Cambria Math" panose="02040503050406030204" pitchFamily="18" charset="0"/>
-                        </a:rPr>
-                        <m:t>=−</m:t>
-                      </m:r>
-                      <m:d>
-                        <m:dPr>
-                          <m:ctrlPr>
-                            <a:rPr lang="en-US" altLang="zh-CN" sz="2000" b="0" i="1" smtClean="0">
-                              <a:latin typeface="Cambria Math" panose="02040503050406030204" pitchFamily="18" charset="0"/>
-                            </a:rPr>
-                          </m:ctrlPr>
-                        </m:dPr>
-                        <m:e>
-                          <m:r>
-                            <a:rPr lang="en-US" altLang="zh-CN" sz="2000" b="0" i="1" smtClean="0">
-                              <a:latin typeface="Cambria Math" panose="02040503050406030204" pitchFamily="18" charset="0"/>
-                            </a:rPr>
-                            <m:t>𝑉</m:t>
-                          </m:r>
-                          <m:r>
-                            <a:rPr lang="en-US" altLang="zh-CN" sz="2000" b="0" i="1" smtClean="0">
-                              <a:latin typeface="Cambria Math" panose="02040503050406030204" pitchFamily="18" charset="0"/>
-                            </a:rPr>
-                            <m:t> −</m:t>
-                          </m:r>
-                          <m:sSub>
-                            <m:sSubPr>
-                              <m:ctrlPr>
-                                <a:rPr lang="en-US" altLang="zh-CN" sz="2000" b="0" i="1" smtClean="0">
-                                  <a:latin typeface="Cambria Math" panose="02040503050406030204" pitchFamily="18" charset="0"/>
-                                </a:rPr>
-                              </m:ctrlPr>
-                            </m:sSubPr>
-                            <m:e>
-                              <m:r>
-                                <a:rPr lang="en-US" altLang="zh-CN" sz="2000" b="0" i="1" smtClean="0">
-                                  <a:latin typeface="Cambria Math" panose="02040503050406030204" pitchFamily="18" charset="0"/>
-                                </a:rPr>
-                                <m:t>𝑉</m:t>
-                              </m:r>
-                            </m:e>
-                            <m:sub>
-                              <m:r>
-                                <a:rPr lang="en-US" altLang="zh-CN" sz="2000" b="0" i="1" smtClean="0">
-                                  <a:latin typeface="Cambria Math" panose="02040503050406030204" pitchFamily="18" charset="0"/>
-                                </a:rPr>
-                                <m:t>𝑟𝑒𝑠𝑡</m:t>
-                              </m:r>
-                            </m:sub>
-                          </m:sSub>
-                        </m:e>
-                      </m:d>
-                      <m:r>
-                        <a:rPr lang="en-US" altLang="zh-CN" sz="2000" b="0" i="1" smtClean="0">
-                          <a:latin typeface="Cambria Math" panose="02040503050406030204" pitchFamily="18" charset="0"/>
-                        </a:rPr>
-                        <m:t>+</m:t>
-                      </m:r>
-                      <m:r>
-                        <a:rPr lang="en-US" altLang="zh-CN" sz="2000" b="0" i="1" smtClean="0">
-                          <a:latin typeface="Cambria Math" panose="02040503050406030204" pitchFamily="18" charset="0"/>
-                        </a:rPr>
-                        <m:t>𝑅</m:t>
-                      </m:r>
-                      <m:r>
-                        <a:rPr lang="en-US" altLang="zh-CN" sz="2000" b="0" i="1" smtClean="0">
-                          <a:latin typeface="Cambria Math" panose="02040503050406030204" pitchFamily="18" charset="0"/>
-                        </a:rPr>
-                        <m:t>∑</m:t>
-                      </m:r>
-                      <m:sSub>
-                        <m:sSubPr>
-                          <m:ctrlPr>
-                            <a:rPr lang="en-US" altLang="zh-CN" sz="2000" b="0" i="1" smtClean="0">
-                              <a:latin typeface="Cambria Math" panose="02040503050406030204" pitchFamily="18" charset="0"/>
-                            </a:rPr>
-                          </m:ctrlPr>
-                        </m:sSubPr>
-                        <m:e>
-                          <m:r>
-                            <a:rPr lang="en-US" altLang="zh-CN" sz="2000" b="0" i="1" smtClean="0">
-                              <a:latin typeface="Cambria Math" panose="02040503050406030204" pitchFamily="18" charset="0"/>
-                            </a:rPr>
-                            <m:t>𝐼</m:t>
-                          </m:r>
-                        </m:e>
-                        <m:sub>
-                          <m:r>
-                            <a:rPr lang="en-US" altLang="zh-CN" sz="2000" b="0" i="1" smtClean="0">
-                              <a:latin typeface="Cambria Math" panose="02040503050406030204" pitchFamily="18" charset="0"/>
-                            </a:rPr>
-                            <m:t>𝑗</m:t>
-                          </m:r>
-                        </m:sub>
-                      </m:sSub>
-                      <m:r>
-                        <a:rPr lang="en-US" altLang="zh-CN" sz="2000" b="0" i="1" smtClean="0">
-                          <a:latin typeface="Cambria Math" panose="02040503050406030204" pitchFamily="18" charset="0"/>
-                        </a:rPr>
-                        <m:t>+</m:t>
-                      </m:r>
-                      <m:r>
-                        <a:rPr lang="en-US" altLang="zh-CN" sz="2000" b="0" i="1" smtClean="0">
-                          <a:latin typeface="Cambria Math" panose="02040503050406030204" pitchFamily="18" charset="0"/>
-                        </a:rPr>
-                        <m:t>𝑅𝐼</m:t>
-                      </m:r>
-                      <m:r>
-                        <a:rPr lang="en-US" altLang="zh-CN" sz="2000" b="0" i="1" smtClean="0">
-                          <a:latin typeface="Cambria Math" panose="02040503050406030204" pitchFamily="18" charset="0"/>
-                        </a:rPr>
-                        <m:t>(</m:t>
-                      </m:r>
-                      <m:r>
-                        <a:rPr lang="en-US" altLang="zh-CN" sz="2000" b="0" i="1" smtClean="0">
-                          <a:latin typeface="Cambria Math" panose="02040503050406030204" pitchFamily="18" charset="0"/>
-                        </a:rPr>
-                        <m:t>𝑡</m:t>
-                      </m:r>
-                      <m:r>
-                        <a:rPr lang="en-US" altLang="zh-CN" sz="2000" b="0" i="1" smtClean="0">
-                          <a:latin typeface="Cambria Math" panose="02040503050406030204" pitchFamily="18" charset="0"/>
-                        </a:rPr>
-                        <m:t>)</m:t>
+                        <a:rPr lang="en-US" altLang="zh-CN" sz="2000" i="1" dirty="0" smtClean="0">
+                          <a:latin typeface="Cambria Math" panose="02040503050406030204" pitchFamily="18" charset="0"/>
+                        </a:rPr>
+                        <m:t>𝑗</m:t>
+                      </m:r>
+                      <m:r>
+                        <a:rPr lang="en-US" altLang="zh-CN" sz="2000" i="1" dirty="0" smtClean="0">
+                          <a:latin typeface="Cambria Math" panose="02040503050406030204" pitchFamily="18" charset="0"/>
+                        </a:rPr>
+                        <m:t> = 1, </m:t>
+                      </m:r>
+                      <m:r>
+                        <a:rPr lang="en-US" altLang="zh-CN" sz="2000" i="1" dirty="0">
+                          <a:latin typeface="Cambria Math" panose="02040503050406030204" pitchFamily="18" charset="0"/>
+                        </a:rPr>
+                        <m:t>2</m:t>
                       </m:r>
                     </m:oMath>
                   </m:oMathPara>
@@ -8434,7 +8412,7 @@
             </p:txBody>
           </p:sp>
         </mc:Choice>
-        <mc:Fallback xmlns="">
+        <mc:Fallback>
           <p:sp>
             <p:nvSpPr>
               <p:cNvPr id="21" name="文本框 20">
@@ -8451,8 +8429,8 @@
             </p:nvSpPr>
             <p:spPr>
               <a:xfrm>
-                <a:off x="9101918" y="4932874"/>
-                <a:ext cx="4489109" cy="584327"/>
+                <a:off x="9101918" y="5034474"/>
+                <a:ext cx="4489109" cy="640240"/>
               </a:xfrm>
               <a:prstGeom prst="rect">
                 <a:avLst/>
@@ -8460,7 +8438,7 @@
               <a:blipFill>
                 <a:blip r:embed="rId6"/>
                 <a:stretch>
-                  <a:fillRect/>
+                  <a:fillRect l="-1359" t="-11429" r="-2038" b="-15238"/>
                 </a:stretch>
               </a:blipFill>
             </p:spPr>
@@ -8684,7 +8662,7 @@
           <a:p>
             <a:r>
               <a:rPr lang="en-US" altLang="zh-CN" sz="2000" dirty="0"/>
-              <a:t>in vector form.</a:t>
+              <a:t>one by one.</a:t>
             </a:r>
             <a:endParaRPr lang="zh-CN" altLang="en-US" sz="2000" dirty="0"/>
           </a:p>
@@ -11704,8 +11682,8 @@
           </a:p>
         </p:txBody>
       </p:sp>
-      <mc:AlternateContent xmlns:mc="http://schemas.openxmlformats.org/markup-compatibility/2006" xmlns:a14="http://schemas.microsoft.com/office/drawing/2010/main">
-        <mc:Choice Requires="a14">
+      <mc:AlternateContent xmlns:mc="http://schemas.openxmlformats.org/markup-compatibility/2006">
+        <mc:Choice xmlns:a14="http://schemas.microsoft.com/office/drawing/2010/main" Requires="a14">
           <p:sp>
             <p:nvSpPr>
               <p:cNvPr id="11" name="文本框 10">
@@ -11785,23 +11763,36 @@
                         <a:rPr lang="en-US" altLang="zh-CN" sz="2000" i="1">
                           <a:latin typeface="Cambria Math" panose="02040503050406030204" pitchFamily="18" charset="0"/>
                         </a:rPr>
-                        <m:t>=− </m:t>
-                      </m:r>
-                      <m:r>
-                        <m:rPr>
-                          <m:sty m:val="p"/>
-                        </m:rPr>
-                        <a:rPr lang="en-US" altLang="zh-CN" sz="2000" i="1">
-                          <a:latin typeface="Cambria Math" panose="02040503050406030204" pitchFamily="18" charset="0"/>
-                        </a:rPr>
-                        <m:t>a</m:t>
-                      </m:r>
-                      <m:r>
-                        <a:rPr lang="en-US" altLang="zh-CN" sz="2000" b="0" i="1" smtClean="0">
-                          <a:latin typeface="Cambria Math" panose="02040503050406030204" pitchFamily="18" charset="0"/>
-                        </a:rPr>
-                        <m:t>0</m:t>
-                      </m:r>
+                        <m:t>=</m:t>
+                      </m:r>
+                      <m:sSub>
+                        <m:sSubPr>
+                          <m:ctrlPr>
+                            <a:rPr lang="en-US" altLang="zh-CN" sz="2000" b="0" i="1" smtClean="0">
+                              <a:latin typeface="Cambria Math" panose="02040503050406030204" pitchFamily="18" charset="0"/>
+                            </a:rPr>
+                          </m:ctrlPr>
+                        </m:sSubPr>
+                        <m:e>
+                          <m:r>
+                            <m:rPr>
+                              <m:sty m:val="p"/>
+                            </m:rPr>
+                            <a:rPr lang="en-US" altLang="zh-CN" sz="2000" i="1">
+                              <a:latin typeface="Cambria Math" panose="02040503050406030204" pitchFamily="18" charset="0"/>
+                            </a:rPr>
+                            <m:t>a</m:t>
+                          </m:r>
+                        </m:e>
+                        <m:sub>
+                          <m:r>
+                            <a:rPr lang="en-US" altLang="zh-CN" sz="2000" b="0" i="1" smtClean="0">
+                              <a:latin typeface="Cambria Math" panose="02040503050406030204" pitchFamily="18" charset="0"/>
+                            </a:rPr>
+                            <m:t>0</m:t>
+                          </m:r>
+                        </m:sub>
+                      </m:sSub>
                       <m:r>
                         <a:rPr lang="en-US" altLang="zh-CN" sz="2000" i="1">
                           <a:latin typeface="Cambria Math" panose="02040503050406030204" pitchFamily="18" charset="0"/>
@@ -11944,7 +11935,7 @@
             </p:txBody>
           </p:sp>
         </mc:Choice>
-        <mc:Fallback xmlns="">
+        <mc:Fallback>
           <p:sp>
             <p:nvSpPr>
               <p:cNvPr id="11" name="文本框 10">
@@ -13684,7 +13675,7 @@
         </p:nvSpPr>
         <p:spPr>
           <a:xfrm>
-            <a:off x="7881463" y="15782146"/>
+            <a:off x="8465663" y="15782146"/>
             <a:ext cx="3839384" cy="1015663"/>
           </a:xfrm>
           <a:prstGeom prst="rect">
@@ -13737,7 +13728,7 @@
         <p:spPr>
           <a:xfrm>
             <a:off x="6680200" y="16324049"/>
-            <a:ext cx="1102471" cy="0"/>
+            <a:ext cx="1785463" cy="0"/>
           </a:xfrm>
           <a:prstGeom prst="straightConnector1">
             <a:avLst/>

</xml_diff>

<commit_message>
Modify neurons and snns handbook
</commit_message>
<xml_diff>
--- a/docs/brainpy_handbook/ppt/neus.pptx
+++ b/docs/brainpy_handbook/ppt/neus.pptx
@@ -15,8 +15,11 @@
     <p:sldId id="272" r:id="rId9"/>
     <p:sldId id="273" r:id="rId10"/>
     <p:sldId id="274" r:id="rId11"/>
-    <p:sldId id="275" r:id="rId12"/>
-    <p:sldId id="276" r:id="rId13"/>
+    <p:sldId id="279" r:id="rId12"/>
+    <p:sldId id="275" r:id="rId13"/>
+    <p:sldId id="276" r:id="rId14"/>
+    <p:sldId id="277" r:id="rId15"/>
+    <p:sldId id="278" r:id="rId16"/>
   </p:sldIdLst>
   <p:sldSz cx="13716000" cy="18288000"/>
   <p:notesSz cx="6858000" cy="9144000"/>
@@ -254,7 +257,7 @@
           <a:p>
             <a:fld id="{0E88AB90-0D2D-461D-B22C-FF3F8B460DB8}" type="datetimeFigureOut">
               <a:rPr lang="zh-CN" altLang="en-US" smtClean="0"/>
-              <a:t>2021/4/28</a:t>
+              <a:t>2021/4/29</a:t>
             </a:fld>
             <a:endParaRPr lang="zh-CN" altLang="en-US"/>
           </a:p>
@@ -424,7 +427,7 @@
           <a:p>
             <a:fld id="{0E88AB90-0D2D-461D-B22C-FF3F8B460DB8}" type="datetimeFigureOut">
               <a:rPr lang="zh-CN" altLang="en-US" smtClean="0"/>
-              <a:t>2021/4/28</a:t>
+              <a:t>2021/4/29</a:t>
             </a:fld>
             <a:endParaRPr lang="zh-CN" altLang="en-US"/>
           </a:p>
@@ -604,7 +607,7 @@
           <a:p>
             <a:fld id="{0E88AB90-0D2D-461D-B22C-FF3F8B460DB8}" type="datetimeFigureOut">
               <a:rPr lang="zh-CN" altLang="en-US" smtClean="0"/>
-              <a:t>2021/4/28</a:t>
+              <a:t>2021/4/29</a:t>
             </a:fld>
             <a:endParaRPr lang="zh-CN" altLang="en-US"/>
           </a:p>
@@ -774,7 +777,7 @@
           <a:p>
             <a:fld id="{0E88AB90-0D2D-461D-B22C-FF3F8B460DB8}" type="datetimeFigureOut">
               <a:rPr lang="zh-CN" altLang="en-US" smtClean="0"/>
-              <a:t>2021/4/28</a:t>
+              <a:t>2021/4/29</a:t>
             </a:fld>
             <a:endParaRPr lang="zh-CN" altLang="en-US"/>
           </a:p>
@@ -1018,7 +1021,7 @@
           <a:p>
             <a:fld id="{0E88AB90-0D2D-461D-B22C-FF3F8B460DB8}" type="datetimeFigureOut">
               <a:rPr lang="zh-CN" altLang="en-US" smtClean="0"/>
-              <a:t>2021/4/28</a:t>
+              <a:t>2021/4/29</a:t>
             </a:fld>
             <a:endParaRPr lang="zh-CN" altLang="en-US"/>
           </a:p>
@@ -1250,7 +1253,7 @@
           <a:p>
             <a:fld id="{0E88AB90-0D2D-461D-B22C-FF3F8B460DB8}" type="datetimeFigureOut">
               <a:rPr lang="zh-CN" altLang="en-US" smtClean="0"/>
-              <a:t>2021/4/28</a:t>
+              <a:t>2021/4/29</a:t>
             </a:fld>
             <a:endParaRPr lang="zh-CN" altLang="en-US"/>
           </a:p>
@@ -1617,7 +1620,7 @@
           <a:p>
             <a:fld id="{0E88AB90-0D2D-461D-B22C-FF3F8B460DB8}" type="datetimeFigureOut">
               <a:rPr lang="zh-CN" altLang="en-US" smtClean="0"/>
-              <a:t>2021/4/28</a:t>
+              <a:t>2021/4/29</a:t>
             </a:fld>
             <a:endParaRPr lang="zh-CN" altLang="en-US"/>
           </a:p>
@@ -1735,7 +1738,7 @@
           <a:p>
             <a:fld id="{0E88AB90-0D2D-461D-B22C-FF3F8B460DB8}" type="datetimeFigureOut">
               <a:rPr lang="zh-CN" altLang="en-US" smtClean="0"/>
-              <a:t>2021/4/28</a:t>
+              <a:t>2021/4/29</a:t>
             </a:fld>
             <a:endParaRPr lang="zh-CN" altLang="en-US"/>
           </a:p>
@@ -1830,7 +1833,7 @@
           <a:p>
             <a:fld id="{0E88AB90-0D2D-461D-B22C-FF3F8B460DB8}" type="datetimeFigureOut">
               <a:rPr lang="zh-CN" altLang="en-US" smtClean="0"/>
-              <a:t>2021/4/28</a:t>
+              <a:t>2021/4/29</a:t>
             </a:fld>
             <a:endParaRPr lang="zh-CN" altLang="en-US"/>
           </a:p>
@@ -2107,7 +2110,7 @@
           <a:p>
             <a:fld id="{0E88AB90-0D2D-461D-B22C-FF3F8B460DB8}" type="datetimeFigureOut">
               <a:rPr lang="zh-CN" altLang="en-US" smtClean="0"/>
-              <a:t>2021/4/28</a:t>
+              <a:t>2021/4/29</a:t>
             </a:fld>
             <a:endParaRPr lang="zh-CN" altLang="en-US"/>
           </a:p>
@@ -2364,7 +2367,7 @@
           <a:p>
             <a:fld id="{0E88AB90-0D2D-461D-B22C-FF3F8B460DB8}" type="datetimeFigureOut">
               <a:rPr lang="zh-CN" altLang="en-US" smtClean="0"/>
-              <a:t>2021/4/28</a:t>
+              <a:t>2021/4/29</a:t>
             </a:fld>
             <a:endParaRPr lang="zh-CN" altLang="en-US"/>
           </a:p>
@@ -2577,7 +2580,7 @@
           <a:p>
             <a:fld id="{0E88AB90-0D2D-461D-B22C-FF3F8B460DB8}" type="datetimeFigureOut">
               <a:rPr lang="zh-CN" altLang="en-US" smtClean="0"/>
-              <a:t>2021/4/28</a:t>
+              <a:t>2021/4/29</a:t>
             </a:fld>
             <a:endParaRPr lang="zh-CN" altLang="en-US"/>
           </a:p>
@@ -6997,6 +7000,694 @@
           <p:cNvPr id="3" name="图片 2">
             <a:extLst>
               <a:ext uri="{FF2B5EF4-FFF2-40B4-BE49-F238E27FC236}">
+                <a16:creationId xmlns:a16="http://schemas.microsoft.com/office/drawing/2014/main" id="{35D9EF8E-5E66-44BA-A15F-4EB50B8CB3A6}"/>
+              </a:ext>
+            </a:extLst>
+          </p:cNvPr>
+          <p:cNvPicPr>
+            <a:picLocks noChangeAspect="1"/>
+          </p:cNvPicPr>
+          <p:nvPr/>
+        </p:nvPicPr>
+        <p:blipFill>
+          <a:blip r:embed="rId2"/>
+          <a:stretch>
+            <a:fillRect/>
+          </a:stretch>
+        </p:blipFill>
+        <p:spPr>
+          <a:xfrm>
+            <a:off x="0" y="7442087"/>
+            <a:ext cx="10800000" cy="6265094"/>
+          </a:xfrm>
+          <a:prstGeom prst="rect">
+            <a:avLst/>
+          </a:prstGeom>
+        </p:spPr>
+      </p:pic>
+      <p:sp>
+        <p:nvSpPr>
+          <p:cNvPr id="4" name="文本框 3">
+            <a:extLst>
+              <a:ext uri="{FF2B5EF4-FFF2-40B4-BE49-F238E27FC236}">
+                <a16:creationId xmlns:a16="http://schemas.microsoft.com/office/drawing/2014/main" id="{6B585CA2-5BA2-416E-AFEB-8C582B37A319}"/>
+              </a:ext>
+            </a:extLst>
+          </p:cNvPr>
+          <p:cNvSpPr txBox="1"/>
+          <p:nvPr/>
+        </p:nvSpPr>
+        <p:spPr>
+          <a:xfrm>
+            <a:off x="7062121" y="10754367"/>
+            <a:ext cx="3839384" cy="400110"/>
+          </a:xfrm>
+          <a:prstGeom prst="rect">
+            <a:avLst/>
+          </a:prstGeom>
+          <a:noFill/>
+        </p:spPr>
+        <p:txBody>
+          <a:bodyPr wrap="square" rtlCol="0">
+            <a:spAutoFit/>
+          </a:bodyPr>
+          <a:lstStyle/>
+          <a:p>
+            <a:r>
+              <a:rPr lang="en-US" altLang="zh-CN" sz="2000" dirty="0"/>
+              <a:t>Plot nullcline.</a:t>
+            </a:r>
+            <a:endParaRPr lang="zh-CN" altLang="en-US" sz="2000" dirty="0"/>
+          </a:p>
+        </p:txBody>
+      </p:sp>
+      <p:sp>
+        <p:nvSpPr>
+          <p:cNvPr id="10" name="文本框 9">
+            <a:extLst>
+              <a:ext uri="{FF2B5EF4-FFF2-40B4-BE49-F238E27FC236}">
+                <a16:creationId xmlns:a16="http://schemas.microsoft.com/office/drawing/2014/main" id="{3842B924-0279-4747-8C2A-86FC1582D9CE}"/>
+              </a:ext>
+            </a:extLst>
+          </p:cNvPr>
+          <p:cNvSpPr txBox="1"/>
+          <p:nvPr/>
+        </p:nvSpPr>
+        <p:spPr>
+          <a:xfrm>
+            <a:off x="7047945" y="11125939"/>
+            <a:ext cx="3839384" cy="400110"/>
+          </a:xfrm>
+          <a:prstGeom prst="rect">
+            <a:avLst/>
+          </a:prstGeom>
+          <a:noFill/>
+        </p:spPr>
+        <p:txBody>
+          <a:bodyPr wrap="square" rtlCol="0">
+            <a:spAutoFit/>
+          </a:bodyPr>
+          <a:lstStyle/>
+          <a:p>
+            <a:r>
+              <a:rPr lang="en-US" altLang="zh-CN" sz="2000" dirty="0"/>
+              <a:t>Plot fixed points.</a:t>
+            </a:r>
+            <a:endParaRPr lang="zh-CN" altLang="en-US" sz="2000" dirty="0"/>
+          </a:p>
+        </p:txBody>
+      </p:sp>
+      <p:sp>
+        <p:nvSpPr>
+          <p:cNvPr id="11" name="文本框 10">
+            <a:extLst>
+              <a:ext uri="{FF2B5EF4-FFF2-40B4-BE49-F238E27FC236}">
+                <a16:creationId xmlns:a16="http://schemas.microsoft.com/office/drawing/2014/main" id="{5FB1916F-2AB7-4F0F-9566-AE39385DAD59}"/>
+              </a:ext>
+            </a:extLst>
+          </p:cNvPr>
+          <p:cNvSpPr txBox="1"/>
+          <p:nvPr/>
+        </p:nvSpPr>
+        <p:spPr>
+          <a:xfrm>
+            <a:off x="7047945" y="11509798"/>
+            <a:ext cx="3839384" cy="400110"/>
+          </a:xfrm>
+          <a:prstGeom prst="rect">
+            <a:avLst/>
+          </a:prstGeom>
+          <a:noFill/>
+        </p:spPr>
+        <p:txBody>
+          <a:bodyPr wrap="square" rtlCol="0">
+            <a:spAutoFit/>
+          </a:bodyPr>
+          <a:lstStyle/>
+          <a:p>
+            <a:r>
+              <a:rPr lang="en-US" altLang="zh-CN" sz="2000" dirty="0"/>
+              <a:t>Plot vector field.</a:t>
+            </a:r>
+            <a:endParaRPr lang="zh-CN" altLang="en-US" sz="2000" dirty="0"/>
+          </a:p>
+        </p:txBody>
+      </p:sp>
+      <p:sp>
+        <p:nvSpPr>
+          <p:cNvPr id="12" name="文本框 11">
+            <a:extLst>
+              <a:ext uri="{FF2B5EF4-FFF2-40B4-BE49-F238E27FC236}">
+                <a16:creationId xmlns:a16="http://schemas.microsoft.com/office/drawing/2014/main" id="{BF5CEA7A-48DE-40D8-A959-69B1B97C2EFA}"/>
+              </a:ext>
+            </a:extLst>
+          </p:cNvPr>
+          <p:cNvSpPr txBox="1"/>
+          <p:nvPr/>
+        </p:nvSpPr>
+        <p:spPr>
+          <a:xfrm>
+            <a:off x="7047945" y="12075987"/>
+            <a:ext cx="3839384" cy="1015663"/>
+          </a:xfrm>
+          <a:prstGeom prst="rect">
+            <a:avLst/>
+          </a:prstGeom>
+          <a:noFill/>
+        </p:spPr>
+        <p:txBody>
+          <a:bodyPr wrap="square" rtlCol="0">
+            <a:spAutoFit/>
+          </a:bodyPr>
+          <a:lstStyle/>
+          <a:p>
+            <a:r>
+              <a:rPr lang="en-US" altLang="zh-CN" sz="2000" dirty="0"/>
+              <a:t>Plot trajectory.</a:t>
+            </a:r>
+          </a:p>
+          <a:p>
+            <a:r>
+              <a:rPr lang="en-US" altLang="zh-CN" sz="2000" dirty="0"/>
+              <a:t>Define start point of trajectory and simulation duration.</a:t>
+            </a:r>
+            <a:endParaRPr lang="zh-CN" altLang="en-US" sz="2000" dirty="0"/>
+          </a:p>
+        </p:txBody>
+      </p:sp>
+      <p:cxnSp>
+        <p:nvCxnSpPr>
+          <p:cNvPr id="17" name="直接箭头连接符 16">
+            <a:extLst>
+              <a:ext uri="{FF2B5EF4-FFF2-40B4-BE49-F238E27FC236}">
+                <a16:creationId xmlns:a16="http://schemas.microsoft.com/office/drawing/2014/main" id="{D259CA62-C9F6-4649-A711-B2412707427D}"/>
+              </a:ext>
+            </a:extLst>
+          </p:cNvPr>
+          <p:cNvCxnSpPr>
+            <a:cxnSpLocks/>
+          </p:cNvCxnSpPr>
+          <p:nvPr/>
+        </p:nvCxnSpPr>
+        <p:spPr>
+          <a:xfrm>
+            <a:off x="5483352" y="10972800"/>
+            <a:ext cx="1570689" cy="0"/>
+          </a:xfrm>
+          <a:prstGeom prst="straightConnector1">
+            <a:avLst/>
+          </a:prstGeom>
+          <a:ln>
+            <a:tailEnd type="triangle"/>
+          </a:ln>
+        </p:spPr>
+        <p:style>
+          <a:lnRef idx="1">
+            <a:schemeClr val="dk1"/>
+          </a:lnRef>
+          <a:fillRef idx="0">
+            <a:schemeClr val="dk1"/>
+          </a:fillRef>
+          <a:effectRef idx="0">
+            <a:schemeClr val="dk1"/>
+          </a:effectRef>
+          <a:fontRef idx="minor">
+            <a:schemeClr val="tx1"/>
+          </a:fontRef>
+        </p:style>
+      </p:cxnSp>
+      <p:cxnSp>
+        <p:nvCxnSpPr>
+          <p:cNvPr id="18" name="直接箭头连接符 17">
+            <a:extLst>
+              <a:ext uri="{FF2B5EF4-FFF2-40B4-BE49-F238E27FC236}">
+                <a16:creationId xmlns:a16="http://schemas.microsoft.com/office/drawing/2014/main" id="{AB2DA4AA-1741-4E40-ADED-1834D7434FDE}"/>
+              </a:ext>
+            </a:extLst>
+          </p:cNvPr>
+          <p:cNvCxnSpPr>
+            <a:cxnSpLocks/>
+          </p:cNvCxnSpPr>
+          <p:nvPr/>
+        </p:nvCxnSpPr>
+        <p:spPr>
+          <a:xfrm>
+            <a:off x="5705856" y="11298936"/>
+            <a:ext cx="1348185" cy="0"/>
+          </a:xfrm>
+          <a:prstGeom prst="straightConnector1">
+            <a:avLst/>
+          </a:prstGeom>
+          <a:ln>
+            <a:tailEnd type="triangle"/>
+          </a:ln>
+        </p:spPr>
+        <p:style>
+          <a:lnRef idx="1">
+            <a:schemeClr val="dk1"/>
+          </a:lnRef>
+          <a:fillRef idx="0">
+            <a:schemeClr val="dk1"/>
+          </a:fillRef>
+          <a:effectRef idx="0">
+            <a:schemeClr val="dk1"/>
+          </a:effectRef>
+          <a:fontRef idx="minor">
+            <a:schemeClr val="tx1"/>
+          </a:fontRef>
+        </p:style>
+      </p:cxnSp>
+      <p:cxnSp>
+        <p:nvCxnSpPr>
+          <p:cNvPr id="19" name="直接箭头连接符 18">
+            <a:extLst>
+              <a:ext uri="{FF2B5EF4-FFF2-40B4-BE49-F238E27FC236}">
+                <a16:creationId xmlns:a16="http://schemas.microsoft.com/office/drawing/2014/main" id="{614D0296-9A6E-49E0-9F38-42C4DEBAACBF}"/>
+              </a:ext>
+            </a:extLst>
+          </p:cNvPr>
+          <p:cNvCxnSpPr>
+            <a:cxnSpLocks/>
+          </p:cNvCxnSpPr>
+          <p:nvPr/>
+        </p:nvCxnSpPr>
+        <p:spPr>
+          <a:xfrm>
+            <a:off x="5867400" y="11692128"/>
+            <a:ext cx="1186641" cy="0"/>
+          </a:xfrm>
+          <a:prstGeom prst="straightConnector1">
+            <a:avLst/>
+          </a:prstGeom>
+          <a:ln>
+            <a:tailEnd type="triangle"/>
+          </a:ln>
+        </p:spPr>
+        <p:style>
+          <a:lnRef idx="1">
+            <a:schemeClr val="dk1"/>
+          </a:lnRef>
+          <a:fillRef idx="0">
+            <a:schemeClr val="dk1"/>
+          </a:fillRef>
+          <a:effectRef idx="0">
+            <a:schemeClr val="dk1"/>
+          </a:effectRef>
+          <a:fontRef idx="minor">
+            <a:schemeClr val="tx1"/>
+          </a:fontRef>
+        </p:style>
+      </p:cxnSp>
+      <p:sp>
+        <p:nvSpPr>
+          <p:cNvPr id="25" name="文本框 24">
+            <a:extLst>
+              <a:ext uri="{FF2B5EF4-FFF2-40B4-BE49-F238E27FC236}">
+                <a16:creationId xmlns:a16="http://schemas.microsoft.com/office/drawing/2014/main" id="{C214FBC1-D65C-466B-AAB9-7D23A89DF70E}"/>
+              </a:ext>
+            </a:extLst>
+          </p:cNvPr>
+          <p:cNvSpPr txBox="1"/>
+          <p:nvPr/>
+        </p:nvSpPr>
+        <p:spPr>
+          <a:xfrm>
+            <a:off x="8455151" y="8575185"/>
+            <a:ext cx="5318085" cy="400110"/>
+          </a:xfrm>
+          <a:prstGeom prst="rect">
+            <a:avLst/>
+          </a:prstGeom>
+          <a:noFill/>
+        </p:spPr>
+        <p:txBody>
+          <a:bodyPr wrap="square" rtlCol="0">
+            <a:spAutoFit/>
+          </a:bodyPr>
+          <a:lstStyle/>
+          <a:p>
+            <a:r>
+              <a:rPr lang="en-US" altLang="zh-CN" sz="2000" dirty="0"/>
+              <a:t>Variables to be showed in phase plane.</a:t>
+            </a:r>
+            <a:endParaRPr lang="zh-CN" altLang="en-US" sz="2000" dirty="0"/>
+          </a:p>
+        </p:txBody>
+      </p:sp>
+      <p:sp>
+        <p:nvSpPr>
+          <p:cNvPr id="26" name="文本框 25">
+            <a:extLst>
+              <a:ext uri="{FF2B5EF4-FFF2-40B4-BE49-F238E27FC236}">
+                <a16:creationId xmlns:a16="http://schemas.microsoft.com/office/drawing/2014/main" id="{B9C14CF1-C4C8-4A13-AE49-17A6519D633A}"/>
+              </a:ext>
+            </a:extLst>
+          </p:cNvPr>
+          <p:cNvSpPr txBox="1"/>
+          <p:nvPr/>
+        </p:nvSpPr>
+        <p:spPr>
+          <a:xfrm>
+            <a:off x="8455151" y="8923547"/>
+            <a:ext cx="5318085" cy="400110"/>
+          </a:xfrm>
+          <a:prstGeom prst="rect">
+            <a:avLst/>
+          </a:prstGeom>
+          <a:noFill/>
+        </p:spPr>
+        <p:txBody>
+          <a:bodyPr wrap="square" rtlCol="0">
+            <a:spAutoFit/>
+          </a:bodyPr>
+          <a:lstStyle/>
+          <a:p>
+            <a:r>
+              <a:rPr lang="en-US" altLang="zh-CN" sz="2000" dirty="0"/>
+              <a:t>Variables to be fixed in phase plane.</a:t>
+            </a:r>
+            <a:endParaRPr lang="zh-CN" altLang="en-US" sz="2000" dirty="0"/>
+          </a:p>
+        </p:txBody>
+      </p:sp>
+      <p:sp>
+        <p:nvSpPr>
+          <p:cNvPr id="27" name="文本框 26">
+            <a:extLst>
+              <a:ext uri="{FF2B5EF4-FFF2-40B4-BE49-F238E27FC236}">
+                <a16:creationId xmlns:a16="http://schemas.microsoft.com/office/drawing/2014/main" id="{E73F012D-291C-4996-AA48-188FFD8FAB5C}"/>
+              </a:ext>
+            </a:extLst>
+          </p:cNvPr>
+          <p:cNvSpPr txBox="1"/>
+          <p:nvPr/>
+        </p:nvSpPr>
+        <p:spPr>
+          <a:xfrm>
+            <a:off x="8455151" y="8205520"/>
+            <a:ext cx="5318085" cy="400110"/>
+          </a:xfrm>
+          <a:prstGeom prst="rect">
+            <a:avLst/>
+          </a:prstGeom>
+          <a:noFill/>
+        </p:spPr>
+        <p:txBody>
+          <a:bodyPr wrap="square" rtlCol="0">
+            <a:spAutoFit/>
+          </a:bodyPr>
+          <a:lstStyle/>
+          <a:p>
+            <a:r>
+              <a:rPr lang="en-US" altLang="zh-CN" sz="2000" dirty="0"/>
+              <a:t>Dynamic system to be analyzed.</a:t>
+            </a:r>
+            <a:endParaRPr lang="zh-CN" altLang="en-US" sz="2000" dirty="0"/>
+          </a:p>
+        </p:txBody>
+      </p:sp>
+      <p:sp>
+        <p:nvSpPr>
+          <p:cNvPr id="28" name="文本框 27">
+            <a:extLst>
+              <a:ext uri="{FF2B5EF4-FFF2-40B4-BE49-F238E27FC236}">
+                <a16:creationId xmlns:a16="http://schemas.microsoft.com/office/drawing/2014/main" id="{05F6A380-9DFE-46B6-A27F-0EC02A1B07AE}"/>
+              </a:ext>
+            </a:extLst>
+          </p:cNvPr>
+          <p:cNvSpPr txBox="1"/>
+          <p:nvPr/>
+        </p:nvSpPr>
+        <p:spPr>
+          <a:xfrm>
+            <a:off x="8455151" y="9641574"/>
+            <a:ext cx="3733800" cy="400110"/>
+          </a:xfrm>
+          <a:prstGeom prst="rect">
+            <a:avLst/>
+          </a:prstGeom>
+          <a:noFill/>
+        </p:spPr>
+        <p:txBody>
+          <a:bodyPr wrap="square" rtlCol="0">
+            <a:spAutoFit/>
+          </a:bodyPr>
+          <a:lstStyle/>
+          <a:p>
+            <a:r>
+              <a:rPr lang="en-US" altLang="zh-CN" sz="2000" dirty="0"/>
+              <a:t>Other parameters to be fixed.</a:t>
+            </a:r>
+            <a:endParaRPr lang="zh-CN" altLang="en-US" sz="2000" dirty="0"/>
+          </a:p>
+        </p:txBody>
+      </p:sp>
+      <p:cxnSp>
+        <p:nvCxnSpPr>
+          <p:cNvPr id="29" name="直接箭头连接符 28">
+            <a:extLst>
+              <a:ext uri="{FF2B5EF4-FFF2-40B4-BE49-F238E27FC236}">
+                <a16:creationId xmlns:a16="http://schemas.microsoft.com/office/drawing/2014/main" id="{DA3107AF-CACA-4A22-A816-63D6A1DE3543}"/>
+              </a:ext>
+            </a:extLst>
+          </p:cNvPr>
+          <p:cNvCxnSpPr>
+            <a:cxnSpLocks/>
+          </p:cNvCxnSpPr>
+          <p:nvPr/>
+        </p:nvCxnSpPr>
+        <p:spPr>
+          <a:xfrm>
+            <a:off x="6884462" y="8405575"/>
+            <a:ext cx="1570689" cy="0"/>
+          </a:xfrm>
+          <a:prstGeom prst="straightConnector1">
+            <a:avLst/>
+          </a:prstGeom>
+          <a:ln>
+            <a:tailEnd type="triangle"/>
+          </a:ln>
+        </p:spPr>
+        <p:style>
+          <a:lnRef idx="1">
+            <a:schemeClr val="dk1"/>
+          </a:lnRef>
+          <a:fillRef idx="0">
+            <a:schemeClr val="dk1"/>
+          </a:fillRef>
+          <a:effectRef idx="0">
+            <a:schemeClr val="dk1"/>
+          </a:effectRef>
+          <a:fontRef idx="minor">
+            <a:schemeClr val="tx1"/>
+          </a:fontRef>
+        </p:style>
+      </p:cxnSp>
+      <p:cxnSp>
+        <p:nvCxnSpPr>
+          <p:cNvPr id="30" name="直接箭头连接符 29">
+            <a:extLst>
+              <a:ext uri="{FF2B5EF4-FFF2-40B4-BE49-F238E27FC236}">
+                <a16:creationId xmlns:a16="http://schemas.microsoft.com/office/drawing/2014/main" id="{27E799D1-5269-46CC-8739-514797131EA9}"/>
+              </a:ext>
+            </a:extLst>
+          </p:cNvPr>
+          <p:cNvCxnSpPr>
+            <a:cxnSpLocks/>
+          </p:cNvCxnSpPr>
+          <p:nvPr/>
+        </p:nvCxnSpPr>
+        <p:spPr>
+          <a:xfrm>
+            <a:off x="7223760" y="8775240"/>
+            <a:ext cx="1231391" cy="0"/>
+          </a:xfrm>
+          <a:prstGeom prst="straightConnector1">
+            <a:avLst/>
+          </a:prstGeom>
+          <a:ln>
+            <a:tailEnd type="triangle"/>
+          </a:ln>
+        </p:spPr>
+        <p:style>
+          <a:lnRef idx="1">
+            <a:schemeClr val="dk1"/>
+          </a:lnRef>
+          <a:fillRef idx="0">
+            <a:schemeClr val="dk1"/>
+          </a:fillRef>
+          <a:effectRef idx="0">
+            <a:schemeClr val="dk1"/>
+          </a:effectRef>
+          <a:fontRef idx="minor">
+            <a:schemeClr val="tx1"/>
+          </a:fontRef>
+        </p:style>
+      </p:cxnSp>
+      <p:cxnSp>
+        <p:nvCxnSpPr>
+          <p:cNvPr id="32" name="直接箭头连接符 31">
+            <a:extLst>
+              <a:ext uri="{FF2B5EF4-FFF2-40B4-BE49-F238E27FC236}">
+                <a16:creationId xmlns:a16="http://schemas.microsoft.com/office/drawing/2014/main" id="{5E235E81-7723-40C2-B729-F3C03A63BDD9}"/>
+              </a:ext>
+            </a:extLst>
+          </p:cNvPr>
+          <p:cNvCxnSpPr>
+            <a:cxnSpLocks/>
+          </p:cNvCxnSpPr>
+          <p:nvPr/>
+        </p:nvCxnSpPr>
+        <p:spPr>
+          <a:xfrm>
+            <a:off x="6884462" y="9123602"/>
+            <a:ext cx="1570689" cy="0"/>
+          </a:xfrm>
+          <a:prstGeom prst="straightConnector1">
+            <a:avLst/>
+          </a:prstGeom>
+          <a:ln>
+            <a:tailEnd type="triangle"/>
+          </a:ln>
+        </p:spPr>
+        <p:style>
+          <a:lnRef idx="1">
+            <a:schemeClr val="dk1"/>
+          </a:lnRef>
+          <a:fillRef idx="0">
+            <a:schemeClr val="dk1"/>
+          </a:fillRef>
+          <a:effectRef idx="0">
+            <a:schemeClr val="dk1"/>
+          </a:effectRef>
+          <a:fontRef idx="minor">
+            <a:schemeClr val="tx1"/>
+          </a:fontRef>
+        </p:style>
+      </p:cxnSp>
+      <p:sp>
+        <p:nvSpPr>
+          <p:cNvPr id="33" name="右大括号 32">
+            <a:extLst>
+              <a:ext uri="{FF2B5EF4-FFF2-40B4-BE49-F238E27FC236}">
+                <a16:creationId xmlns:a16="http://schemas.microsoft.com/office/drawing/2014/main" id="{DFEA7D9B-AEEB-4BFB-BA40-5880D127BAF5}"/>
+              </a:ext>
+            </a:extLst>
+          </p:cNvPr>
+          <p:cNvSpPr/>
+          <p:nvPr/>
+        </p:nvSpPr>
+        <p:spPr>
+          <a:xfrm>
+            <a:off x="6838041" y="12075987"/>
+            <a:ext cx="216000" cy="1464034"/>
+          </a:xfrm>
+          <a:prstGeom prst="rightBrace">
+            <a:avLst/>
+          </a:prstGeom>
+        </p:spPr>
+        <p:style>
+          <a:lnRef idx="1">
+            <a:schemeClr val="dk1"/>
+          </a:lnRef>
+          <a:fillRef idx="0">
+            <a:schemeClr val="dk1"/>
+          </a:fillRef>
+          <a:effectRef idx="0">
+            <a:schemeClr val="dk1"/>
+          </a:effectRef>
+          <a:fontRef idx="minor">
+            <a:schemeClr val="tx1"/>
+          </a:fontRef>
+        </p:style>
+        <p:txBody>
+          <a:bodyPr rtlCol="0" anchor="ctr"/>
+          <a:lstStyle/>
+          <a:p>
+            <a:pPr algn="ctr"/>
+            <a:endParaRPr lang="zh-CN" altLang="en-US"/>
+          </a:p>
+        </p:txBody>
+      </p:sp>
+      <p:sp>
+        <p:nvSpPr>
+          <p:cNvPr id="34" name="右大括号 33">
+            <a:extLst>
+              <a:ext uri="{FF2B5EF4-FFF2-40B4-BE49-F238E27FC236}">
+                <a16:creationId xmlns:a16="http://schemas.microsoft.com/office/drawing/2014/main" id="{88825D77-5AB4-48B5-9EA4-20B1A406DCC6}"/>
+              </a:ext>
+            </a:extLst>
+          </p:cNvPr>
+          <p:cNvSpPr/>
+          <p:nvPr/>
+        </p:nvSpPr>
+        <p:spPr>
+          <a:xfrm>
+            <a:off x="8239151" y="9369063"/>
+            <a:ext cx="216000" cy="1001443"/>
+          </a:xfrm>
+          <a:prstGeom prst="rightBrace">
+            <a:avLst/>
+          </a:prstGeom>
+        </p:spPr>
+        <p:style>
+          <a:lnRef idx="1">
+            <a:schemeClr val="dk1"/>
+          </a:lnRef>
+          <a:fillRef idx="0">
+            <a:schemeClr val="dk1"/>
+          </a:fillRef>
+          <a:effectRef idx="0">
+            <a:schemeClr val="dk1"/>
+          </a:effectRef>
+          <a:fontRef idx="minor">
+            <a:schemeClr val="tx1"/>
+          </a:fontRef>
+        </p:style>
+        <p:txBody>
+          <a:bodyPr rtlCol="0" anchor="ctr"/>
+          <a:lstStyle/>
+          <a:p>
+            <a:pPr algn="ctr"/>
+            <a:endParaRPr lang="zh-CN" altLang="en-US"/>
+          </a:p>
+        </p:txBody>
+      </p:sp>
+    </p:spTree>
+    <p:extLst>
+      <p:ext uri="{BB962C8B-B14F-4D97-AF65-F5344CB8AC3E}">
+        <p14:creationId xmlns:p14="http://schemas.microsoft.com/office/powerpoint/2010/main" val="4004142972"/>
+      </p:ext>
+    </p:extLst>
+  </p:cSld>
+  <p:clrMapOvr>
+    <a:masterClrMapping/>
+  </p:clrMapOvr>
+</p:sld>
+</file>
+
+<file path=ppt/slides/slide12.xml><?xml version="1.0" encoding="utf-8"?>
+<p:sld xmlns:a="http://schemas.openxmlformats.org/drawingml/2006/main" xmlns:r="http://schemas.openxmlformats.org/officeDocument/2006/relationships" xmlns:p="http://schemas.openxmlformats.org/presentationml/2006/main">
+  <p:cSld>
+    <p:spTree>
+      <p:nvGrpSpPr>
+        <p:cNvPr id="1" name=""/>
+        <p:cNvGrpSpPr/>
+        <p:nvPr/>
+      </p:nvGrpSpPr>
+      <p:grpSpPr>
+        <a:xfrm>
+          <a:off x="0" y="0"/>
+          <a:ext cx="0" cy="0"/>
+          <a:chOff x="0" y="0"/>
+          <a:chExt cx="0" cy="0"/>
+        </a:xfrm>
+      </p:grpSpPr>
+      <p:pic>
+        <p:nvPicPr>
+          <p:cNvPr id="3" name="图片 2">
+            <a:extLst>
+              <a:ext uri="{FF2B5EF4-FFF2-40B4-BE49-F238E27FC236}">
                 <a16:creationId xmlns:a16="http://schemas.microsoft.com/office/drawing/2014/main" id="{531615AE-4624-43A6-8249-65EBE13572F4}"/>
               </a:ext>
             </a:extLst>
@@ -7166,8 +7857,8 @@
           </a:p>
         </p:txBody>
       </p:sp>
-      <mc:AlternateContent xmlns:mc="http://schemas.openxmlformats.org/markup-compatibility/2006">
-        <mc:Choice xmlns:a14="http://schemas.microsoft.com/office/drawing/2010/main" Requires="a14">
+      <mc:AlternateContent xmlns:mc="http://schemas.openxmlformats.org/markup-compatibility/2006" xmlns:a14="http://schemas.microsoft.com/office/drawing/2010/main">
+        <mc:Choice Requires="a14">
           <p:sp>
             <p:nvSpPr>
               <p:cNvPr id="7" name="文本框 6">
@@ -7310,7 +8001,7 @@
             </p:txBody>
           </p:sp>
         </mc:Choice>
-        <mc:Fallback>
+        <mc:Fallback xmlns="">
           <p:sp>
             <p:nvSpPr>
               <p:cNvPr id="7" name="文本框 6">
@@ -7703,8 +8394,8 @@
           </a:fontRef>
         </p:style>
       </p:cxnSp>
-      <mc:AlternateContent xmlns:mc="http://schemas.openxmlformats.org/markup-compatibility/2006">
-        <mc:Choice xmlns:a14="http://schemas.microsoft.com/office/drawing/2010/main" Requires="a14">
+      <mc:AlternateContent xmlns:mc="http://schemas.openxmlformats.org/markup-compatibility/2006" xmlns:a14="http://schemas.microsoft.com/office/drawing/2010/main">
+        <mc:Choice Requires="a14">
           <p:sp>
             <p:nvSpPr>
               <p:cNvPr id="17" name="文本框 16">
@@ -7950,7 +8641,7 @@
             </p:txBody>
           </p:sp>
         </mc:Choice>
-        <mc:Fallback>
+        <mc:Fallback xmlns="">
           <p:sp>
             <p:nvSpPr>
               <p:cNvPr id="17" name="文本框 16">
@@ -7995,8 +8686,8 @@
           </p:sp>
         </mc:Fallback>
       </mc:AlternateContent>
-      <mc:AlternateContent xmlns:mc="http://schemas.openxmlformats.org/markup-compatibility/2006">
-        <mc:Choice xmlns:a14="http://schemas.microsoft.com/office/drawing/2010/main" Requires="a14">
+      <mc:AlternateContent xmlns:mc="http://schemas.openxmlformats.org/markup-compatibility/2006" xmlns:a14="http://schemas.microsoft.com/office/drawing/2010/main">
+        <mc:Choice Requires="a14">
           <p:sp>
             <p:nvSpPr>
               <p:cNvPr id="20" name="文本框 19">
@@ -8139,7 +8830,7 @@
             </p:txBody>
           </p:sp>
         </mc:Choice>
-        <mc:Fallback>
+        <mc:Fallback xmlns="">
           <p:sp>
             <p:nvSpPr>
               <p:cNvPr id="20" name="文本框 19">
@@ -8184,8 +8875,8 @@
           </p:sp>
         </mc:Fallback>
       </mc:AlternateContent>
-      <mc:AlternateContent xmlns:mc="http://schemas.openxmlformats.org/markup-compatibility/2006">
-        <mc:Choice xmlns:a14="http://schemas.microsoft.com/office/drawing/2010/main" Requires="a14">
+      <mc:AlternateContent xmlns:mc="http://schemas.openxmlformats.org/markup-compatibility/2006" xmlns:a14="http://schemas.microsoft.com/office/drawing/2010/main">
+        <mc:Choice Requires="a14">
           <p:sp>
             <p:nvSpPr>
               <p:cNvPr id="21" name="文本框 20">
@@ -8214,7 +8905,6 @@
               </a:bodyPr>
               <a:lstStyle/>
               <a:p>
-                <a:pPr/>
                 <a14:m>
                   <m:oMath xmlns:m="http://schemas.openxmlformats.org/officeDocument/2006/math">
                     <m:r>
@@ -8396,13 +9086,7 @@
                         <a:rPr lang="en-US" altLang="zh-CN" sz="2000" i="1" dirty="0" smtClean="0">
                           <a:latin typeface="Cambria Math" panose="02040503050406030204" pitchFamily="18" charset="0"/>
                         </a:rPr>
-                        <m:t> = 1, </m:t>
-                      </m:r>
-                      <m:r>
-                        <a:rPr lang="en-US" altLang="zh-CN" sz="2000" i="1" dirty="0">
-                          <a:latin typeface="Cambria Math" panose="02040503050406030204" pitchFamily="18" charset="0"/>
-                        </a:rPr>
-                        <m:t>2</m:t>
+                        <m:t> = 1, 2</m:t>
                       </m:r>
                     </m:oMath>
                   </m:oMathPara>
@@ -8412,7 +9096,7 @@
             </p:txBody>
           </p:sp>
         </mc:Choice>
-        <mc:Fallback>
+        <mc:Fallback xmlns="">
           <p:sp>
             <p:nvSpPr>
               <p:cNvPr id="21" name="文本框 20">
@@ -8470,7 +9154,7 @@
 </p:sld>
 </file>
 
-<file path=ppt/slides/slide12.xml><?xml version="1.0" encoding="utf-8"?>
+<file path=ppt/slides/slide13.xml><?xml version="1.0" encoding="utf-8"?>
 <p:sld xmlns:a="http://schemas.openxmlformats.org/drawingml/2006/main" xmlns:r="http://schemas.openxmlformats.org/officeDocument/2006/relationships" xmlns:p="http://schemas.openxmlformats.org/presentationml/2006/main">
   <p:cSld>
     <p:spTree>
@@ -9530,6 +10214,2159 @@
 </p:sld>
 </file>
 
+<file path=ppt/slides/slide14.xml><?xml version="1.0" encoding="utf-8"?>
+<p:sld xmlns:a="http://schemas.openxmlformats.org/drawingml/2006/main" xmlns:r="http://schemas.openxmlformats.org/officeDocument/2006/relationships" xmlns:p="http://schemas.openxmlformats.org/presentationml/2006/main">
+  <p:cSld>
+    <p:spTree>
+      <p:nvGrpSpPr>
+        <p:cNvPr id="1" name=""/>
+        <p:cNvGrpSpPr/>
+        <p:nvPr/>
+      </p:nvGrpSpPr>
+      <p:grpSpPr>
+        <a:xfrm>
+          <a:off x="0" y="0"/>
+          <a:ext cx="0" cy="0"/>
+          <a:chOff x="0" y="0"/>
+          <a:chExt cx="0" cy="0"/>
+        </a:xfrm>
+      </p:grpSpPr>
+      <p:pic>
+        <p:nvPicPr>
+          <p:cNvPr id="3" name="图片 2">
+            <a:extLst>
+              <a:ext uri="{FF2B5EF4-FFF2-40B4-BE49-F238E27FC236}">
+                <a16:creationId xmlns:a16="http://schemas.microsoft.com/office/drawing/2014/main" id="{7CBDA0E5-FE65-4788-8369-64CEDF3B26F3}"/>
+              </a:ext>
+            </a:extLst>
+          </p:cNvPr>
+          <p:cNvPicPr>
+            <a:picLocks noChangeAspect="1"/>
+          </p:cNvPicPr>
+          <p:nvPr/>
+        </p:nvPicPr>
+        <p:blipFill>
+          <a:blip r:embed="rId2">
+            <a:extLst>
+              <a:ext uri="{28A0092B-C50C-407E-A947-70E740481C1C}">
+                <a14:useLocalDpi xmlns:a14="http://schemas.microsoft.com/office/drawing/2010/main" val="0"/>
+              </a:ext>
+            </a:extLst>
+          </a:blip>
+          <a:stretch>
+            <a:fillRect/>
+          </a:stretch>
+        </p:blipFill>
+        <p:spPr>
+          <a:xfrm>
+            <a:off x="0" y="4663941"/>
+            <a:ext cx="10800000" cy="7397636"/>
+          </a:xfrm>
+          <a:prstGeom prst="rect">
+            <a:avLst/>
+          </a:prstGeom>
+        </p:spPr>
+      </p:pic>
+      <p:sp>
+        <p:nvSpPr>
+          <p:cNvPr id="4" name="标题 1">
+            <a:extLst>
+              <a:ext uri="{FF2B5EF4-FFF2-40B4-BE49-F238E27FC236}">
+                <a16:creationId xmlns:a16="http://schemas.microsoft.com/office/drawing/2014/main" id="{E4147012-CD44-4043-AD09-ADC7803A973B}"/>
+              </a:ext>
+            </a:extLst>
+          </p:cNvPr>
+          <p:cNvSpPr txBox="1">
+            <a:spLocks/>
+          </p:cNvSpPr>
+          <p:nvPr/>
+        </p:nvSpPr>
+        <p:spPr>
+          <a:xfrm>
+            <a:off x="942975" y="124632"/>
+            <a:ext cx="11792569" cy="1405447"/>
+          </a:xfrm>
+          <a:prstGeom prst="rect">
+            <a:avLst/>
+          </a:prstGeom>
+        </p:spPr>
+        <p:txBody>
+          <a:bodyPr vert="horz" lIns="91440" tIns="45720" rIns="91440" bIns="45720" rtlCol="0" anchor="ctr">
+            <a:normAutofit/>
+          </a:bodyPr>
+          <a:lstStyle>
+            <a:lvl1pPr algn="l" defTabSz="1371600" rtl="0" eaLnBrk="1" latinLnBrk="0" hangingPunct="1">
+              <a:lnSpc>
+                <a:spcPct val="90000"/>
+              </a:lnSpc>
+              <a:spcBef>
+                <a:spcPct val="0"/>
+              </a:spcBef>
+              <a:buNone/>
+              <a:defRPr sz="6600" kern="1200">
+                <a:solidFill>
+                  <a:schemeClr val="tx1"/>
+                </a:solidFill>
+                <a:latin typeface="+mj-lt"/>
+                <a:ea typeface="+mj-ea"/>
+                <a:cs typeface="+mj-cs"/>
+              </a:defRPr>
+            </a:lvl1pPr>
+          </a:lstStyle>
+          <a:p>
+            <a:r>
+              <a:rPr lang="en-US" altLang="zh-CN" dirty="0"/>
+              <a:t>Firing Rate Unit</a:t>
+            </a:r>
+            <a:endParaRPr lang="zh-CN" altLang="en-US" dirty="0"/>
+          </a:p>
+        </p:txBody>
+      </p:sp>
+      <mc:AlternateContent xmlns:mc="http://schemas.openxmlformats.org/markup-compatibility/2006" xmlns:a14="http://schemas.microsoft.com/office/drawing/2010/main">
+        <mc:Choice Requires="a14">
+          <p:sp>
+            <p:nvSpPr>
+              <p:cNvPr id="6" name="文本框 5">
+                <a:extLst>
+                  <a:ext uri="{FF2B5EF4-FFF2-40B4-BE49-F238E27FC236}">
+                    <a16:creationId xmlns:a16="http://schemas.microsoft.com/office/drawing/2014/main" id="{0D2486C6-64D9-4823-81E4-555A50200312}"/>
+                  </a:ext>
+                </a:extLst>
+              </p:cNvPr>
+              <p:cNvSpPr txBox="1"/>
+              <p:nvPr/>
+            </p:nvSpPr>
+            <p:spPr>
+              <a:xfrm>
+                <a:off x="7017507" y="9044057"/>
+                <a:ext cx="7107102" cy="676660"/>
+              </a:xfrm>
+              <a:prstGeom prst="rect">
+                <a:avLst/>
+              </a:prstGeom>
+              <a:noFill/>
+            </p:spPr>
+            <p:txBody>
+              <a:bodyPr wrap="square">
+                <a:spAutoFit/>
+              </a:bodyPr>
+              <a:lstStyle/>
+              <a:p>
+                <a:pPr/>
+                <a14:m>
+                  <m:oMathPara xmlns:m="http://schemas.openxmlformats.org/officeDocument/2006/math">
+                    <m:oMathParaPr>
+                      <m:jc m:val="left"/>
+                    </m:oMathParaPr>
+                    <m:oMath xmlns:m="http://schemas.openxmlformats.org/officeDocument/2006/math">
+                      <m:sSub>
+                        <m:sSubPr>
+                          <m:ctrlPr>
+                            <a:rPr lang="en-US" altLang="zh-CN" sz="2000" b="0" i="1" smtClean="0">
+                              <a:latin typeface="Cambria Math" panose="02040503050406030204" pitchFamily="18" charset="0"/>
+                            </a:rPr>
+                          </m:ctrlPr>
+                        </m:sSubPr>
+                        <m:e>
+                          <m:r>
+                            <m:rPr>
+                              <m:sty m:val="p"/>
+                            </m:rPr>
+                            <a:rPr lang="el-GR" altLang="zh-CN" sz="2000" i="1" smtClean="0">
+                              <a:latin typeface="Cambria Math" panose="02040503050406030204" pitchFamily="18" charset="0"/>
+                            </a:rPr>
+                            <m:t>τ</m:t>
+                          </m:r>
+                        </m:e>
+                        <m:sub>
+                          <m:r>
+                            <a:rPr lang="en-US" altLang="zh-CN" sz="2000" b="0" i="1" smtClean="0">
+                              <a:latin typeface="Cambria Math" panose="02040503050406030204" pitchFamily="18" charset="0"/>
+                            </a:rPr>
+                            <m:t>𝑒</m:t>
+                          </m:r>
+                        </m:sub>
+                      </m:sSub>
+                      <m:f>
+                        <m:fPr>
+                          <m:ctrlPr>
+                            <a:rPr lang="en-US" altLang="zh-CN" sz="2000" i="1">
+                              <a:latin typeface="Cambria Math" panose="02040503050406030204" pitchFamily="18" charset="0"/>
+                            </a:rPr>
+                          </m:ctrlPr>
+                        </m:fPr>
+                        <m:num>
+                          <m:r>
+                            <a:rPr lang="en-US" altLang="zh-CN" sz="2000" i="1">
+                              <a:latin typeface="Cambria Math" panose="02040503050406030204" pitchFamily="18" charset="0"/>
+                            </a:rPr>
+                            <m:t>𝑑</m:t>
+                          </m:r>
+                          <m:sSub>
+                            <m:sSubPr>
+                              <m:ctrlPr>
+                                <a:rPr lang="en-US" altLang="zh-CN" sz="2000" b="0" i="1" smtClean="0">
+                                  <a:latin typeface="Cambria Math" panose="02040503050406030204" pitchFamily="18" charset="0"/>
+                                </a:rPr>
+                              </m:ctrlPr>
+                            </m:sSubPr>
+                            <m:e>
+                              <m:r>
+                                <a:rPr lang="en-US" altLang="zh-CN" sz="2000" b="0" i="1" smtClean="0">
+                                  <a:latin typeface="Cambria Math" panose="02040503050406030204" pitchFamily="18" charset="0"/>
+                                </a:rPr>
+                                <m:t>𝑎</m:t>
+                              </m:r>
+                            </m:e>
+                            <m:sub>
+                              <m:r>
+                                <a:rPr lang="en-US" altLang="zh-CN" sz="2000" b="0" i="1" smtClean="0">
+                                  <a:latin typeface="Cambria Math" panose="02040503050406030204" pitchFamily="18" charset="0"/>
+                                </a:rPr>
+                                <m:t>𝑒</m:t>
+                              </m:r>
+                            </m:sub>
+                          </m:sSub>
+                        </m:num>
+                        <m:den>
+                          <m:r>
+                            <a:rPr lang="en-US" altLang="zh-CN" sz="2000" i="1">
+                              <a:latin typeface="Cambria Math" panose="02040503050406030204" pitchFamily="18" charset="0"/>
+                            </a:rPr>
+                            <m:t>𝑑𝑡</m:t>
+                          </m:r>
+                        </m:den>
+                      </m:f>
+                      <m:r>
+                        <a:rPr lang="en-US" altLang="zh-CN" sz="2000" i="1">
+                          <a:latin typeface="Cambria Math" panose="02040503050406030204" pitchFamily="18" charset="0"/>
+                        </a:rPr>
+                        <m:t>=</m:t>
+                      </m:r>
+                      <m:r>
+                        <a:rPr lang="en-US" altLang="zh-CN" sz="2000" i="1" smtClean="0">
+                          <a:latin typeface="Cambria Math" panose="02040503050406030204" pitchFamily="18" charset="0"/>
+                        </a:rPr>
+                        <m:t>−</m:t>
+                      </m:r>
+                      <m:sSub>
+                        <m:sSubPr>
+                          <m:ctrlPr>
+                            <a:rPr lang="en-US" altLang="zh-CN" sz="2000" b="0" i="1" smtClean="0">
+                              <a:latin typeface="Cambria Math" panose="02040503050406030204" pitchFamily="18" charset="0"/>
+                            </a:rPr>
+                          </m:ctrlPr>
+                        </m:sSubPr>
+                        <m:e>
+                          <m:r>
+                            <a:rPr lang="en-US" altLang="zh-CN" sz="2000" b="0" i="1" smtClean="0">
+                              <a:latin typeface="Cambria Math" panose="02040503050406030204" pitchFamily="18" charset="0"/>
+                            </a:rPr>
+                            <m:t>𝑎</m:t>
+                          </m:r>
+                        </m:e>
+                        <m:sub>
+                          <m:r>
+                            <a:rPr lang="en-US" altLang="zh-CN" sz="2000" b="0" i="1" smtClean="0">
+                              <a:latin typeface="Cambria Math" panose="02040503050406030204" pitchFamily="18" charset="0"/>
+                            </a:rPr>
+                            <m:t>𝑒</m:t>
+                          </m:r>
+                        </m:sub>
+                      </m:sSub>
+                      <m:r>
+                        <a:rPr lang="en-US" altLang="zh-CN" sz="2000" b="0" i="1" smtClean="0">
+                          <a:latin typeface="Cambria Math" panose="02040503050406030204" pitchFamily="18" charset="0"/>
+                        </a:rPr>
+                        <m:t>+</m:t>
+                      </m:r>
+                      <m:d>
+                        <m:dPr>
+                          <m:ctrlPr>
+                            <a:rPr lang="en-US" altLang="zh-CN" sz="2000" b="0" i="1" smtClean="0">
+                              <a:latin typeface="Cambria Math" panose="02040503050406030204" pitchFamily="18" charset="0"/>
+                            </a:rPr>
+                          </m:ctrlPr>
+                        </m:dPr>
+                        <m:e>
+                          <m:sSub>
+                            <m:sSubPr>
+                              <m:ctrlPr>
+                                <a:rPr lang="en-US" altLang="zh-CN" sz="2000" b="0" i="1" smtClean="0">
+                                  <a:latin typeface="Cambria Math" panose="02040503050406030204" pitchFamily="18" charset="0"/>
+                                </a:rPr>
+                              </m:ctrlPr>
+                            </m:sSubPr>
+                            <m:e>
+                              <m:r>
+                                <a:rPr lang="en-US" altLang="zh-CN" sz="2000" b="0" i="1" smtClean="0">
+                                  <a:latin typeface="Cambria Math" panose="02040503050406030204" pitchFamily="18" charset="0"/>
+                                </a:rPr>
+                                <m:t>𝑘</m:t>
+                              </m:r>
+                            </m:e>
+                            <m:sub>
+                              <m:r>
+                                <a:rPr lang="en-US" altLang="zh-CN" sz="2000" b="0" i="1" smtClean="0">
+                                  <a:latin typeface="Cambria Math" panose="02040503050406030204" pitchFamily="18" charset="0"/>
+                                </a:rPr>
+                                <m:t>𝑒</m:t>
+                              </m:r>
+                            </m:sub>
+                          </m:sSub>
+                          <m:r>
+                            <a:rPr lang="en-US" altLang="zh-CN" sz="2000" b="0" i="1" smtClean="0">
+                              <a:latin typeface="Cambria Math" panose="02040503050406030204" pitchFamily="18" charset="0"/>
+                            </a:rPr>
+                            <m:t>−</m:t>
+                          </m:r>
+                          <m:sSub>
+                            <m:sSubPr>
+                              <m:ctrlPr>
+                                <a:rPr lang="en-US" altLang="zh-CN" sz="2000" b="0" i="1" smtClean="0">
+                                  <a:latin typeface="Cambria Math" panose="02040503050406030204" pitchFamily="18" charset="0"/>
+                                </a:rPr>
+                              </m:ctrlPr>
+                            </m:sSubPr>
+                            <m:e>
+                              <m:r>
+                                <a:rPr lang="en-US" altLang="zh-CN" sz="2000" b="0" i="1" smtClean="0">
+                                  <a:latin typeface="Cambria Math" panose="02040503050406030204" pitchFamily="18" charset="0"/>
+                                </a:rPr>
+                                <m:t>𝑟</m:t>
+                              </m:r>
+                            </m:e>
+                            <m:sub>
+                              <m:r>
+                                <a:rPr lang="en-US" altLang="zh-CN" sz="2000" b="0" i="1" smtClean="0">
+                                  <a:latin typeface="Cambria Math" panose="02040503050406030204" pitchFamily="18" charset="0"/>
+                                </a:rPr>
+                                <m:t>𝑒</m:t>
+                              </m:r>
+                            </m:sub>
+                          </m:sSub>
+                          <m:r>
+                            <a:rPr lang="en-US" altLang="zh-CN" sz="2000" b="0" i="1" smtClean="0">
+                              <a:latin typeface="Cambria Math" panose="02040503050406030204" pitchFamily="18" charset="0"/>
+                            </a:rPr>
+                            <m:t>∗</m:t>
+                          </m:r>
+                          <m:sSub>
+                            <m:sSubPr>
+                              <m:ctrlPr>
+                                <a:rPr lang="en-US" altLang="zh-CN" sz="2000" b="0" i="1" smtClean="0">
+                                  <a:latin typeface="Cambria Math" panose="02040503050406030204" pitchFamily="18" charset="0"/>
+                                </a:rPr>
+                              </m:ctrlPr>
+                            </m:sSubPr>
+                            <m:e>
+                              <m:r>
+                                <a:rPr lang="en-US" altLang="zh-CN" sz="2000" b="0" i="1" smtClean="0">
+                                  <a:latin typeface="Cambria Math" panose="02040503050406030204" pitchFamily="18" charset="0"/>
+                                </a:rPr>
+                                <m:t>𝑎</m:t>
+                              </m:r>
+                            </m:e>
+                            <m:sub>
+                              <m:r>
+                                <a:rPr lang="en-US" altLang="zh-CN" sz="2000" b="0" i="1" smtClean="0">
+                                  <a:latin typeface="Cambria Math" panose="02040503050406030204" pitchFamily="18" charset="0"/>
+                                </a:rPr>
+                                <m:t>𝑒</m:t>
+                              </m:r>
+                            </m:sub>
+                          </m:sSub>
+                        </m:e>
+                      </m:d>
+                      <m:r>
+                        <a:rPr lang="en-US" altLang="zh-CN" sz="2000" b="0" i="0" smtClean="0">
+                          <a:latin typeface="Cambria Math" panose="02040503050406030204" pitchFamily="18" charset="0"/>
+                        </a:rPr>
+                        <m:t>∗</m:t>
+                      </m:r>
+                      <m:sSub>
+                        <m:sSubPr>
+                          <m:ctrlPr>
+                            <a:rPr lang="en-US" altLang="zh-CN" sz="2000" b="0" i="1" smtClean="0">
+                              <a:latin typeface="Cambria Math" panose="02040503050406030204" pitchFamily="18" charset="0"/>
+                            </a:rPr>
+                          </m:ctrlPr>
+                        </m:sSubPr>
+                        <m:e>
+                          <m:r>
+                            <m:rPr>
+                              <m:sty m:val="p"/>
+                            </m:rPr>
+                            <a:rPr lang="en-US" altLang="zh-CN" sz="2000" b="0" i="0" smtClean="0">
+                              <a:latin typeface="Cambria Math" panose="02040503050406030204" pitchFamily="18" charset="0"/>
+                            </a:rPr>
+                            <m:t>S</m:t>
+                          </m:r>
+                        </m:e>
+                        <m:sub>
+                          <m:r>
+                            <m:rPr>
+                              <m:sty m:val="p"/>
+                            </m:rPr>
+                            <a:rPr lang="en-US" altLang="zh-CN" sz="2000" b="0" i="0" smtClean="0">
+                              <a:latin typeface="Cambria Math" panose="02040503050406030204" pitchFamily="18" charset="0"/>
+                            </a:rPr>
+                            <m:t>e</m:t>
+                          </m:r>
+                        </m:sub>
+                      </m:sSub>
+                      <m:r>
+                        <a:rPr lang="en-US" altLang="zh-CN" sz="2000" b="0" i="0" smtClean="0">
+                          <a:latin typeface="Cambria Math" panose="02040503050406030204" pitchFamily="18" charset="0"/>
+                        </a:rPr>
+                        <m:t>(</m:t>
+                      </m:r>
+                      <m:sSub>
+                        <m:sSubPr>
+                          <m:ctrlPr>
+                            <a:rPr lang="en-US" altLang="zh-CN" sz="2000" b="0" i="1" smtClean="0">
+                              <a:latin typeface="Cambria Math" panose="02040503050406030204" pitchFamily="18" charset="0"/>
+                            </a:rPr>
+                          </m:ctrlPr>
+                        </m:sSubPr>
+                        <m:e>
+                          <m:r>
+                            <m:rPr>
+                              <m:sty m:val="p"/>
+                            </m:rPr>
+                            <a:rPr lang="en-US" altLang="zh-CN" sz="2000" b="0" i="0" smtClean="0">
+                              <a:latin typeface="Cambria Math" panose="02040503050406030204" pitchFamily="18" charset="0"/>
+                            </a:rPr>
+                            <m:t>c</m:t>
+                          </m:r>
+                        </m:e>
+                        <m:sub>
+                          <m:r>
+                            <a:rPr lang="en-US" altLang="zh-CN" sz="2000" b="0" i="0" smtClean="0">
+                              <a:latin typeface="Cambria Math" panose="02040503050406030204" pitchFamily="18" charset="0"/>
+                            </a:rPr>
+                            <m:t>1</m:t>
+                          </m:r>
+                        </m:sub>
+                      </m:sSub>
+                      <m:sSub>
+                        <m:sSubPr>
+                          <m:ctrlPr>
+                            <a:rPr lang="en-US" altLang="zh-CN" sz="2000" b="0" i="1" smtClean="0">
+                              <a:latin typeface="Cambria Math" panose="02040503050406030204" pitchFamily="18" charset="0"/>
+                            </a:rPr>
+                          </m:ctrlPr>
+                        </m:sSubPr>
+                        <m:e>
+                          <m:r>
+                            <m:rPr>
+                              <m:sty m:val="p"/>
+                            </m:rPr>
+                            <a:rPr lang="en-US" altLang="zh-CN" sz="2000" b="0" i="0" smtClean="0">
+                              <a:latin typeface="Cambria Math" panose="02040503050406030204" pitchFamily="18" charset="0"/>
+                            </a:rPr>
+                            <m:t>a</m:t>
+                          </m:r>
+                        </m:e>
+                        <m:sub>
+                          <m:r>
+                            <m:rPr>
+                              <m:sty m:val="p"/>
+                            </m:rPr>
+                            <a:rPr lang="en-US" altLang="zh-CN" sz="2000" b="0" i="0" smtClean="0">
+                              <a:latin typeface="Cambria Math" panose="02040503050406030204" pitchFamily="18" charset="0"/>
+                            </a:rPr>
+                            <m:t>e</m:t>
+                          </m:r>
+                        </m:sub>
+                      </m:sSub>
+                      <m:r>
+                        <a:rPr lang="en-US" altLang="zh-CN" sz="2000" b="0" i="0" smtClean="0">
+                          <a:latin typeface="Cambria Math" panose="02040503050406030204" pitchFamily="18" charset="0"/>
+                        </a:rPr>
+                        <m:t>−</m:t>
+                      </m:r>
+                      <m:sSub>
+                        <m:sSubPr>
+                          <m:ctrlPr>
+                            <a:rPr lang="en-US" altLang="zh-CN" sz="2000" b="0" i="1" smtClean="0">
+                              <a:latin typeface="Cambria Math" panose="02040503050406030204" pitchFamily="18" charset="0"/>
+                            </a:rPr>
+                          </m:ctrlPr>
+                        </m:sSubPr>
+                        <m:e>
+                          <m:r>
+                            <m:rPr>
+                              <m:sty m:val="p"/>
+                            </m:rPr>
+                            <a:rPr lang="en-US" altLang="zh-CN" sz="2000" b="0" i="0" smtClean="0">
+                              <a:latin typeface="Cambria Math" panose="02040503050406030204" pitchFamily="18" charset="0"/>
+                            </a:rPr>
+                            <m:t>c</m:t>
+                          </m:r>
+                        </m:e>
+                        <m:sub>
+                          <m:r>
+                            <a:rPr lang="en-US" altLang="zh-CN" sz="2000" b="0" i="0" smtClean="0">
+                              <a:latin typeface="Cambria Math" panose="02040503050406030204" pitchFamily="18" charset="0"/>
+                            </a:rPr>
+                            <m:t>2</m:t>
+                          </m:r>
+                        </m:sub>
+                      </m:sSub>
+                      <m:sSub>
+                        <m:sSubPr>
+                          <m:ctrlPr>
+                            <a:rPr lang="en-US" altLang="zh-CN" sz="2000" b="0" i="1" smtClean="0">
+                              <a:latin typeface="Cambria Math" panose="02040503050406030204" pitchFamily="18" charset="0"/>
+                            </a:rPr>
+                          </m:ctrlPr>
+                        </m:sSubPr>
+                        <m:e>
+                          <m:r>
+                            <m:rPr>
+                              <m:sty m:val="p"/>
+                            </m:rPr>
+                            <a:rPr lang="en-US" altLang="zh-CN" sz="2000" b="0" i="0" smtClean="0">
+                              <a:latin typeface="Cambria Math" panose="02040503050406030204" pitchFamily="18" charset="0"/>
+                            </a:rPr>
+                            <m:t>a</m:t>
+                          </m:r>
+                        </m:e>
+                        <m:sub>
+                          <m:r>
+                            <m:rPr>
+                              <m:sty m:val="p"/>
+                            </m:rPr>
+                            <a:rPr lang="en-US" altLang="zh-CN" sz="2000" b="0" i="0" smtClean="0">
+                              <a:latin typeface="Cambria Math" panose="02040503050406030204" pitchFamily="18" charset="0"/>
+                            </a:rPr>
+                            <m:t>i</m:t>
+                          </m:r>
+                        </m:sub>
+                      </m:sSub>
+                      <m:r>
+                        <a:rPr lang="en-US" altLang="zh-CN" sz="2000" b="0" i="0" smtClean="0">
+                          <a:latin typeface="Cambria Math" panose="02040503050406030204" pitchFamily="18" charset="0"/>
+                        </a:rPr>
+                        <m:t>+</m:t>
+                      </m:r>
+                      <m:sSub>
+                        <m:sSubPr>
+                          <m:ctrlPr>
+                            <a:rPr lang="en-US" altLang="zh-CN" sz="2000" b="0" i="1" smtClean="0">
+                              <a:latin typeface="Cambria Math" panose="02040503050406030204" pitchFamily="18" charset="0"/>
+                            </a:rPr>
+                          </m:ctrlPr>
+                        </m:sSubPr>
+                        <m:e>
+                          <m:sSub>
+                            <m:sSubPr>
+                              <m:ctrlPr>
+                                <a:rPr lang="en-US" altLang="zh-CN" sz="2000" b="0" i="1" smtClean="0">
+                                  <a:latin typeface="Cambria Math" panose="02040503050406030204" pitchFamily="18" charset="0"/>
+                                </a:rPr>
+                              </m:ctrlPr>
+                            </m:sSubPr>
+                            <m:e>
+                              <m:r>
+                                <m:rPr>
+                                  <m:sty m:val="p"/>
+                                </m:rPr>
+                                <a:rPr lang="en-US" altLang="zh-CN" sz="2000" b="0" i="0" smtClean="0">
+                                  <a:latin typeface="Cambria Math" panose="02040503050406030204" pitchFamily="18" charset="0"/>
+                                </a:rPr>
+                                <m:t>I</m:t>
+                              </m:r>
+                            </m:e>
+                            <m:sub>
+                              <m:r>
+                                <m:rPr>
+                                  <m:sty m:val="p"/>
+                                </m:rPr>
+                                <a:rPr lang="en-US" altLang="zh-CN" sz="2000" b="0" i="0" smtClean="0">
+                                  <a:latin typeface="Cambria Math" panose="02040503050406030204" pitchFamily="18" charset="0"/>
+                                </a:rPr>
+                                <m:t>ext</m:t>
+                              </m:r>
+                            </m:sub>
+                          </m:sSub>
+                        </m:e>
+                        <m:sub>
+                          <m:r>
+                            <m:rPr>
+                              <m:sty m:val="p"/>
+                            </m:rPr>
+                            <a:rPr lang="en-US" altLang="zh-CN" sz="2000" b="0" i="0" smtClean="0">
+                              <a:latin typeface="Cambria Math" panose="02040503050406030204" pitchFamily="18" charset="0"/>
+                            </a:rPr>
+                            <m:t>e</m:t>
+                          </m:r>
+                        </m:sub>
+                      </m:sSub>
+                      <m:r>
+                        <a:rPr lang="en-US" altLang="zh-CN" sz="2000" b="0" i="0" smtClean="0">
+                          <a:latin typeface="Cambria Math" panose="02040503050406030204" pitchFamily="18" charset="0"/>
+                        </a:rPr>
+                        <m:t>)</m:t>
+                      </m:r>
+                    </m:oMath>
+                  </m:oMathPara>
+                </a14:m>
+                <a:endParaRPr lang="zh-CN" altLang="en-US" sz="2000" dirty="0"/>
+              </a:p>
+            </p:txBody>
+          </p:sp>
+        </mc:Choice>
+        <mc:Fallback xmlns="">
+          <p:sp>
+            <p:nvSpPr>
+              <p:cNvPr id="6" name="文本框 5">
+                <a:extLst>
+                  <a:ext uri="{FF2B5EF4-FFF2-40B4-BE49-F238E27FC236}">
+                    <a16:creationId xmlns:a16="http://schemas.microsoft.com/office/drawing/2014/main" id="{0D2486C6-64D9-4823-81E4-555A50200312}"/>
+                  </a:ext>
+                </a:extLst>
+              </p:cNvPr>
+              <p:cNvSpPr txBox="1">
+                <a:spLocks noRot="1" noChangeAspect="1" noMove="1" noResize="1" noEditPoints="1" noAdjustHandles="1" noChangeArrowheads="1" noChangeShapeType="1" noTextEdit="1"/>
+              </p:cNvSpPr>
+              <p:nvPr/>
+            </p:nvSpPr>
+            <p:spPr>
+              <a:xfrm>
+                <a:off x="7017507" y="9044057"/>
+                <a:ext cx="7107102" cy="676660"/>
+              </a:xfrm>
+              <a:prstGeom prst="rect">
+                <a:avLst/>
+              </a:prstGeom>
+              <a:blipFill>
+                <a:blip r:embed="rId3"/>
+                <a:stretch>
+                  <a:fillRect/>
+                </a:stretch>
+              </a:blipFill>
+            </p:spPr>
+            <p:txBody>
+              <a:bodyPr/>
+              <a:lstStyle/>
+              <a:p>
+                <a:r>
+                  <a:rPr lang="zh-CN" altLang="en-US">
+                    <a:noFill/>
+                  </a:rPr>
+                  <a:t> </a:t>
+                </a:r>
+              </a:p>
+            </p:txBody>
+          </p:sp>
+        </mc:Fallback>
+      </mc:AlternateContent>
+      <mc:AlternateContent xmlns:mc="http://schemas.openxmlformats.org/markup-compatibility/2006" xmlns:a14="http://schemas.microsoft.com/office/drawing/2010/main">
+        <mc:Choice Requires="a14">
+          <p:sp>
+            <p:nvSpPr>
+              <p:cNvPr id="7" name="文本框 6">
+                <a:extLst>
+                  <a:ext uri="{FF2B5EF4-FFF2-40B4-BE49-F238E27FC236}">
+                    <a16:creationId xmlns:a16="http://schemas.microsoft.com/office/drawing/2014/main" id="{0356246C-BD55-40CB-B084-7E4901D6C15E}"/>
+                  </a:ext>
+                </a:extLst>
+              </p:cNvPr>
+              <p:cNvSpPr txBox="1"/>
+              <p:nvPr/>
+            </p:nvSpPr>
+            <p:spPr>
+              <a:xfrm>
+                <a:off x="8805446" y="7975569"/>
+                <a:ext cx="4970189" cy="774379"/>
+              </a:xfrm>
+              <a:prstGeom prst="rect">
+                <a:avLst/>
+              </a:prstGeom>
+              <a:noFill/>
+            </p:spPr>
+            <p:txBody>
+              <a:bodyPr wrap="square">
+                <a:spAutoFit/>
+              </a:bodyPr>
+              <a:lstStyle/>
+              <a:p>
+                <a:pPr/>
+                <a14:m>
+                  <m:oMathPara xmlns:m="http://schemas.openxmlformats.org/officeDocument/2006/math">
+                    <m:oMathParaPr>
+                      <m:jc m:val="left"/>
+                    </m:oMathParaPr>
+                    <m:oMath xmlns:m="http://schemas.openxmlformats.org/officeDocument/2006/math">
+                      <m:r>
+                        <a:rPr lang="en-US" altLang="zh-CN" sz="2000" b="0" i="1" smtClean="0">
+                          <a:latin typeface="Cambria Math" panose="02040503050406030204" pitchFamily="18" charset="0"/>
+                        </a:rPr>
+                        <m:t>𝑆</m:t>
+                      </m:r>
+                      <m:d>
+                        <m:dPr>
+                          <m:ctrlPr>
+                            <a:rPr lang="en-US" altLang="zh-CN" sz="2000" b="0" i="1" smtClean="0">
+                              <a:latin typeface="Cambria Math" panose="02040503050406030204" pitchFamily="18" charset="0"/>
+                            </a:rPr>
+                          </m:ctrlPr>
+                        </m:dPr>
+                        <m:e>
+                          <m:r>
+                            <a:rPr lang="en-US" altLang="zh-CN" sz="2000" b="0" i="1" smtClean="0">
+                              <a:latin typeface="Cambria Math" panose="02040503050406030204" pitchFamily="18" charset="0"/>
+                            </a:rPr>
+                            <m:t>𝑥</m:t>
+                          </m:r>
+                        </m:e>
+                      </m:d>
+                      <m:r>
+                        <a:rPr lang="en-US" altLang="zh-CN" sz="2000" b="0" i="1" smtClean="0">
+                          <a:latin typeface="Cambria Math" panose="02040503050406030204" pitchFamily="18" charset="0"/>
+                        </a:rPr>
+                        <m:t>=</m:t>
+                      </m:r>
+                      <m:f>
+                        <m:fPr>
+                          <m:ctrlPr>
+                            <a:rPr lang="en-US" altLang="zh-CN" sz="2000" b="0" i="1" smtClean="0">
+                              <a:latin typeface="Cambria Math" panose="02040503050406030204" pitchFamily="18" charset="0"/>
+                            </a:rPr>
+                          </m:ctrlPr>
+                        </m:fPr>
+                        <m:num>
+                          <m:r>
+                            <a:rPr lang="en-US" altLang="zh-CN" sz="2000" b="0" i="1" smtClean="0">
+                              <a:latin typeface="Cambria Math" panose="02040503050406030204" pitchFamily="18" charset="0"/>
+                            </a:rPr>
+                            <m:t>1</m:t>
+                          </m:r>
+                        </m:num>
+                        <m:den>
+                          <m:r>
+                            <a:rPr lang="en-US" altLang="zh-CN" sz="2000" b="0" i="1" smtClean="0">
+                              <a:latin typeface="Cambria Math" panose="02040503050406030204" pitchFamily="18" charset="0"/>
+                            </a:rPr>
+                            <m:t>1+</m:t>
+                          </m:r>
+                          <m:func>
+                            <m:funcPr>
+                              <m:ctrlPr>
+                                <a:rPr lang="en-US" altLang="zh-CN" sz="2000" b="0" i="1" smtClean="0">
+                                  <a:latin typeface="Cambria Math" panose="02040503050406030204" pitchFamily="18" charset="0"/>
+                                </a:rPr>
+                              </m:ctrlPr>
+                            </m:funcPr>
+                            <m:fName>
+                              <m:r>
+                                <m:rPr>
+                                  <m:sty m:val="p"/>
+                                </m:rPr>
+                                <a:rPr lang="en-US" altLang="zh-CN" sz="2000" b="0" i="0" smtClean="0">
+                                  <a:latin typeface="Cambria Math" panose="02040503050406030204" pitchFamily="18" charset="0"/>
+                                </a:rPr>
+                                <m:t>exp</m:t>
+                              </m:r>
+                            </m:fName>
+                            <m:e>
+                              <m:d>
+                                <m:dPr>
+                                  <m:ctrlPr>
+                                    <a:rPr lang="en-US" altLang="zh-CN" sz="2000" b="0" i="1" smtClean="0">
+                                      <a:latin typeface="Cambria Math" panose="02040503050406030204" pitchFamily="18" charset="0"/>
+                                    </a:rPr>
+                                  </m:ctrlPr>
+                                </m:dPr>
+                                <m:e>
+                                  <m:r>
+                                    <a:rPr lang="en-US" altLang="zh-CN" sz="2000" b="0" i="1" smtClean="0">
+                                      <a:latin typeface="Cambria Math" panose="02040503050406030204" pitchFamily="18" charset="0"/>
+                                    </a:rPr>
+                                    <m:t>−</m:t>
+                                  </m:r>
+                                  <m:r>
+                                    <a:rPr lang="en-US" altLang="zh-CN" sz="2000" b="0" i="1" smtClean="0">
+                                      <a:latin typeface="Cambria Math" panose="02040503050406030204" pitchFamily="18" charset="0"/>
+                                    </a:rPr>
+                                    <m:t>𝑎</m:t>
+                                  </m:r>
+                                  <m:d>
+                                    <m:dPr>
+                                      <m:ctrlPr>
+                                        <a:rPr lang="en-US" altLang="zh-CN" sz="2000" b="0" i="1" smtClean="0">
+                                          <a:latin typeface="Cambria Math" panose="02040503050406030204" pitchFamily="18" charset="0"/>
+                                        </a:rPr>
+                                      </m:ctrlPr>
+                                    </m:dPr>
+                                    <m:e>
+                                      <m:r>
+                                        <a:rPr lang="en-US" altLang="zh-CN" sz="2000" b="0" i="1" smtClean="0">
+                                          <a:latin typeface="Cambria Math" panose="02040503050406030204" pitchFamily="18" charset="0"/>
+                                        </a:rPr>
+                                        <m:t>𝑥</m:t>
+                                      </m:r>
+                                      <m:r>
+                                        <a:rPr lang="en-US" altLang="zh-CN" sz="2000" b="0" i="1" smtClean="0">
+                                          <a:latin typeface="Cambria Math" panose="02040503050406030204" pitchFamily="18" charset="0"/>
+                                        </a:rPr>
+                                        <m:t>−</m:t>
+                                      </m:r>
+                                      <m:r>
+                                        <m:rPr>
+                                          <m:sty m:val="p"/>
+                                        </m:rPr>
+                                        <a:rPr lang="en-US" altLang="zh-CN" sz="2000" i="1">
+                                          <a:latin typeface="Cambria Math" panose="02040503050406030204" pitchFamily="18" charset="0"/>
+                                        </a:rPr>
+                                        <m:t>θ</m:t>
+                                      </m:r>
+                                    </m:e>
+                                  </m:d>
+                                </m:e>
+                              </m:d>
+                            </m:e>
+                          </m:func>
+                        </m:den>
+                      </m:f>
+                      <m:r>
+                        <a:rPr lang="en-US" altLang="zh-CN" sz="2000" b="0" i="1" smtClean="0">
+                          <a:latin typeface="Cambria Math" panose="02040503050406030204" pitchFamily="18" charset="0"/>
+                        </a:rPr>
+                        <m:t> −</m:t>
+                      </m:r>
+                      <m:f>
+                        <m:fPr>
+                          <m:ctrlPr>
+                            <a:rPr lang="en-US" altLang="zh-CN" sz="2000" b="0" i="1" smtClean="0">
+                              <a:latin typeface="Cambria Math" panose="02040503050406030204" pitchFamily="18" charset="0"/>
+                            </a:rPr>
+                          </m:ctrlPr>
+                        </m:fPr>
+                        <m:num>
+                          <m:r>
+                            <a:rPr lang="en-US" altLang="zh-CN" sz="2000" b="0" i="1" smtClean="0">
+                              <a:latin typeface="Cambria Math" panose="02040503050406030204" pitchFamily="18" charset="0"/>
+                            </a:rPr>
+                            <m:t>1</m:t>
+                          </m:r>
+                        </m:num>
+                        <m:den>
+                          <m:r>
+                            <a:rPr lang="en-US" altLang="zh-CN" sz="2000" b="0" i="1" smtClean="0">
+                              <a:latin typeface="Cambria Math" panose="02040503050406030204" pitchFamily="18" charset="0"/>
+                            </a:rPr>
+                            <m:t>1+</m:t>
+                          </m:r>
+                          <m:func>
+                            <m:funcPr>
+                              <m:ctrlPr>
+                                <a:rPr lang="en-US" altLang="zh-CN" sz="2000" b="0" i="1" smtClean="0">
+                                  <a:latin typeface="Cambria Math" panose="02040503050406030204" pitchFamily="18" charset="0"/>
+                                </a:rPr>
+                              </m:ctrlPr>
+                            </m:funcPr>
+                            <m:fName>
+                              <m:r>
+                                <m:rPr>
+                                  <m:sty m:val="p"/>
+                                </m:rPr>
+                                <a:rPr lang="en-US" altLang="zh-CN" sz="2000" b="0" i="0" smtClean="0">
+                                  <a:latin typeface="Cambria Math" panose="02040503050406030204" pitchFamily="18" charset="0"/>
+                                </a:rPr>
+                                <m:t>exp</m:t>
+                              </m:r>
+                            </m:fName>
+                            <m:e>
+                              <m:d>
+                                <m:dPr>
+                                  <m:ctrlPr>
+                                    <a:rPr lang="en-US" altLang="zh-CN" sz="2000" b="0" i="1" smtClean="0">
+                                      <a:latin typeface="Cambria Math" panose="02040503050406030204" pitchFamily="18" charset="0"/>
+                                    </a:rPr>
+                                  </m:ctrlPr>
+                                </m:dPr>
+                                <m:e>
+                                  <m:r>
+                                    <a:rPr lang="en-US" altLang="zh-CN" sz="2000" b="0" i="1" smtClean="0">
+                                      <a:latin typeface="Cambria Math" panose="02040503050406030204" pitchFamily="18" charset="0"/>
+                                    </a:rPr>
+                                    <m:t>𝑎</m:t>
+                                  </m:r>
+                                  <m:r>
+                                    <m:rPr>
+                                      <m:sty m:val="p"/>
+                                    </m:rPr>
+                                    <a:rPr lang="en-US" altLang="zh-CN" sz="2000" i="1">
+                                      <a:latin typeface="Cambria Math" panose="02040503050406030204" pitchFamily="18" charset="0"/>
+                                    </a:rPr>
+                                    <m:t>θ</m:t>
+                                  </m:r>
+                                </m:e>
+                              </m:d>
+                            </m:e>
+                          </m:func>
+                        </m:den>
+                      </m:f>
+                    </m:oMath>
+                  </m:oMathPara>
+                </a14:m>
+                <a:endParaRPr lang="zh-CN" altLang="en-US" sz="2000" dirty="0"/>
+              </a:p>
+            </p:txBody>
+          </p:sp>
+        </mc:Choice>
+        <mc:Fallback xmlns="">
+          <p:sp>
+            <p:nvSpPr>
+              <p:cNvPr id="7" name="文本框 6">
+                <a:extLst>
+                  <a:ext uri="{FF2B5EF4-FFF2-40B4-BE49-F238E27FC236}">
+                    <a16:creationId xmlns:a16="http://schemas.microsoft.com/office/drawing/2014/main" id="{0356246C-BD55-40CB-B084-7E4901D6C15E}"/>
+                  </a:ext>
+                </a:extLst>
+              </p:cNvPr>
+              <p:cNvSpPr txBox="1">
+                <a:spLocks noRot="1" noChangeAspect="1" noMove="1" noResize="1" noEditPoints="1" noAdjustHandles="1" noChangeArrowheads="1" noChangeShapeType="1" noTextEdit="1"/>
+              </p:cNvSpPr>
+              <p:nvPr/>
+            </p:nvSpPr>
+            <p:spPr>
+              <a:xfrm>
+                <a:off x="8805446" y="7975569"/>
+                <a:ext cx="4970189" cy="774379"/>
+              </a:xfrm>
+              <a:prstGeom prst="rect">
+                <a:avLst/>
+              </a:prstGeom>
+              <a:blipFill>
+                <a:blip r:embed="rId4"/>
+                <a:stretch>
+                  <a:fillRect/>
+                </a:stretch>
+              </a:blipFill>
+            </p:spPr>
+            <p:txBody>
+              <a:bodyPr/>
+              <a:lstStyle/>
+              <a:p>
+                <a:r>
+                  <a:rPr lang="zh-CN" altLang="en-US">
+                    <a:noFill/>
+                  </a:rPr>
+                  <a:t> </a:t>
+                </a:r>
+              </a:p>
+            </p:txBody>
+          </p:sp>
+        </mc:Fallback>
+      </mc:AlternateContent>
+      <mc:AlternateContent xmlns:mc="http://schemas.openxmlformats.org/markup-compatibility/2006" xmlns:a14="http://schemas.microsoft.com/office/drawing/2010/main">
+        <mc:Choice Requires="a14">
+          <p:sp>
+            <p:nvSpPr>
+              <p:cNvPr id="8" name="文本框 7">
+                <a:extLst>
+                  <a:ext uri="{FF2B5EF4-FFF2-40B4-BE49-F238E27FC236}">
+                    <a16:creationId xmlns:a16="http://schemas.microsoft.com/office/drawing/2014/main" id="{BCDF120E-F6DE-49A8-B4CF-C95B96C8A002}"/>
+                  </a:ext>
+                </a:extLst>
+              </p:cNvPr>
+              <p:cNvSpPr txBox="1"/>
+              <p:nvPr/>
+            </p:nvSpPr>
+            <p:spPr>
+              <a:xfrm>
+                <a:off x="7017507" y="11384916"/>
+                <a:ext cx="7107102" cy="676660"/>
+              </a:xfrm>
+              <a:prstGeom prst="rect">
+                <a:avLst/>
+              </a:prstGeom>
+              <a:noFill/>
+            </p:spPr>
+            <p:txBody>
+              <a:bodyPr wrap="square">
+                <a:spAutoFit/>
+              </a:bodyPr>
+              <a:lstStyle/>
+              <a:p>
+                <a:pPr/>
+                <a14:m>
+                  <m:oMathPara xmlns:m="http://schemas.openxmlformats.org/officeDocument/2006/math">
+                    <m:oMathParaPr>
+                      <m:jc m:val="left"/>
+                    </m:oMathParaPr>
+                    <m:oMath xmlns:m="http://schemas.openxmlformats.org/officeDocument/2006/math">
+                      <m:sSub>
+                        <m:sSubPr>
+                          <m:ctrlPr>
+                            <a:rPr lang="en-US" altLang="zh-CN" sz="2000" b="0" i="1" smtClean="0">
+                              <a:latin typeface="Cambria Math" panose="02040503050406030204" pitchFamily="18" charset="0"/>
+                            </a:rPr>
+                          </m:ctrlPr>
+                        </m:sSubPr>
+                        <m:e>
+                          <m:r>
+                            <m:rPr>
+                              <m:sty m:val="p"/>
+                            </m:rPr>
+                            <a:rPr lang="el-GR" altLang="zh-CN" sz="2000" i="1" smtClean="0">
+                              <a:latin typeface="Cambria Math" panose="02040503050406030204" pitchFamily="18" charset="0"/>
+                            </a:rPr>
+                            <m:t>τ</m:t>
+                          </m:r>
+                        </m:e>
+                        <m:sub>
+                          <m:r>
+                            <m:rPr>
+                              <m:sty m:val="p"/>
+                            </m:rPr>
+                            <a:rPr lang="en-US" altLang="zh-CN" sz="2000" i="1">
+                              <a:latin typeface="Cambria Math" panose="02040503050406030204" pitchFamily="18" charset="0"/>
+                            </a:rPr>
+                            <m:t>i</m:t>
+                          </m:r>
+                        </m:sub>
+                      </m:sSub>
+                      <m:f>
+                        <m:fPr>
+                          <m:ctrlPr>
+                            <a:rPr lang="en-US" altLang="zh-CN" sz="2000" i="1">
+                              <a:latin typeface="Cambria Math" panose="02040503050406030204" pitchFamily="18" charset="0"/>
+                            </a:rPr>
+                          </m:ctrlPr>
+                        </m:fPr>
+                        <m:num>
+                          <m:r>
+                            <a:rPr lang="en-US" altLang="zh-CN" sz="2000" i="1">
+                              <a:latin typeface="Cambria Math" panose="02040503050406030204" pitchFamily="18" charset="0"/>
+                            </a:rPr>
+                            <m:t>𝑑</m:t>
+                          </m:r>
+                          <m:sSub>
+                            <m:sSubPr>
+                              <m:ctrlPr>
+                                <a:rPr lang="en-US" altLang="zh-CN" sz="2000" b="0" i="1" smtClean="0">
+                                  <a:latin typeface="Cambria Math" panose="02040503050406030204" pitchFamily="18" charset="0"/>
+                                </a:rPr>
+                              </m:ctrlPr>
+                            </m:sSubPr>
+                            <m:e>
+                              <m:r>
+                                <a:rPr lang="en-US" altLang="zh-CN" sz="2000" b="0" i="1" smtClean="0">
+                                  <a:latin typeface="Cambria Math" panose="02040503050406030204" pitchFamily="18" charset="0"/>
+                                </a:rPr>
+                                <m:t>𝑎</m:t>
+                              </m:r>
+                            </m:e>
+                            <m:sub>
+                              <m:r>
+                                <a:rPr lang="en-US" altLang="zh-CN" sz="2000" b="0" i="1" smtClean="0">
+                                  <a:latin typeface="Cambria Math" panose="02040503050406030204" pitchFamily="18" charset="0"/>
+                                </a:rPr>
+                                <m:t>𝑖</m:t>
+                              </m:r>
+                            </m:sub>
+                          </m:sSub>
+                        </m:num>
+                        <m:den>
+                          <m:r>
+                            <a:rPr lang="en-US" altLang="zh-CN" sz="2000" i="1">
+                              <a:latin typeface="Cambria Math" panose="02040503050406030204" pitchFamily="18" charset="0"/>
+                            </a:rPr>
+                            <m:t>𝑑𝑡</m:t>
+                          </m:r>
+                        </m:den>
+                      </m:f>
+                      <m:r>
+                        <a:rPr lang="en-US" altLang="zh-CN" sz="2000" i="1">
+                          <a:latin typeface="Cambria Math" panose="02040503050406030204" pitchFamily="18" charset="0"/>
+                        </a:rPr>
+                        <m:t>=</m:t>
+                      </m:r>
+                      <m:r>
+                        <a:rPr lang="en-US" altLang="zh-CN" sz="2000" i="1" smtClean="0">
+                          <a:latin typeface="Cambria Math" panose="02040503050406030204" pitchFamily="18" charset="0"/>
+                        </a:rPr>
+                        <m:t>−</m:t>
+                      </m:r>
+                      <m:sSub>
+                        <m:sSubPr>
+                          <m:ctrlPr>
+                            <a:rPr lang="en-US" altLang="zh-CN" sz="2000" b="0" i="1" smtClean="0">
+                              <a:latin typeface="Cambria Math" panose="02040503050406030204" pitchFamily="18" charset="0"/>
+                            </a:rPr>
+                          </m:ctrlPr>
+                        </m:sSubPr>
+                        <m:e>
+                          <m:r>
+                            <a:rPr lang="en-US" altLang="zh-CN" sz="2000" b="0" i="1" smtClean="0">
+                              <a:latin typeface="Cambria Math" panose="02040503050406030204" pitchFamily="18" charset="0"/>
+                            </a:rPr>
+                            <m:t>𝑎</m:t>
+                          </m:r>
+                        </m:e>
+                        <m:sub>
+                          <m:r>
+                            <a:rPr lang="en-US" altLang="zh-CN" sz="2000" b="0" i="1" smtClean="0">
+                              <a:latin typeface="Cambria Math" panose="02040503050406030204" pitchFamily="18" charset="0"/>
+                            </a:rPr>
+                            <m:t>𝑖</m:t>
+                          </m:r>
+                        </m:sub>
+                      </m:sSub>
+                      <m:r>
+                        <a:rPr lang="en-US" altLang="zh-CN" sz="2000" b="0" i="1" smtClean="0">
+                          <a:latin typeface="Cambria Math" panose="02040503050406030204" pitchFamily="18" charset="0"/>
+                        </a:rPr>
+                        <m:t>+</m:t>
+                      </m:r>
+                      <m:d>
+                        <m:dPr>
+                          <m:ctrlPr>
+                            <a:rPr lang="en-US" altLang="zh-CN" sz="2000" b="0" i="1" smtClean="0">
+                              <a:latin typeface="Cambria Math" panose="02040503050406030204" pitchFamily="18" charset="0"/>
+                            </a:rPr>
+                          </m:ctrlPr>
+                        </m:dPr>
+                        <m:e>
+                          <m:sSub>
+                            <m:sSubPr>
+                              <m:ctrlPr>
+                                <a:rPr lang="en-US" altLang="zh-CN" sz="2000" b="0" i="1" smtClean="0">
+                                  <a:latin typeface="Cambria Math" panose="02040503050406030204" pitchFamily="18" charset="0"/>
+                                </a:rPr>
+                              </m:ctrlPr>
+                            </m:sSubPr>
+                            <m:e>
+                              <m:r>
+                                <a:rPr lang="en-US" altLang="zh-CN" sz="2000" b="0" i="1" smtClean="0">
+                                  <a:latin typeface="Cambria Math" panose="02040503050406030204" pitchFamily="18" charset="0"/>
+                                </a:rPr>
+                                <m:t>𝑘</m:t>
+                              </m:r>
+                            </m:e>
+                            <m:sub>
+                              <m:r>
+                                <a:rPr lang="en-US" altLang="zh-CN" sz="2000" b="0" i="1" smtClean="0">
+                                  <a:latin typeface="Cambria Math" panose="02040503050406030204" pitchFamily="18" charset="0"/>
+                                </a:rPr>
+                                <m:t>𝑖</m:t>
+                              </m:r>
+                            </m:sub>
+                          </m:sSub>
+                          <m:r>
+                            <a:rPr lang="en-US" altLang="zh-CN" sz="2000" b="0" i="1" smtClean="0">
+                              <a:latin typeface="Cambria Math" panose="02040503050406030204" pitchFamily="18" charset="0"/>
+                            </a:rPr>
+                            <m:t>−</m:t>
+                          </m:r>
+                          <m:sSub>
+                            <m:sSubPr>
+                              <m:ctrlPr>
+                                <a:rPr lang="en-US" altLang="zh-CN" sz="2000" b="0" i="1" smtClean="0">
+                                  <a:latin typeface="Cambria Math" panose="02040503050406030204" pitchFamily="18" charset="0"/>
+                                </a:rPr>
+                              </m:ctrlPr>
+                            </m:sSubPr>
+                            <m:e>
+                              <m:r>
+                                <a:rPr lang="en-US" altLang="zh-CN" sz="2000" b="0" i="1" smtClean="0">
+                                  <a:latin typeface="Cambria Math" panose="02040503050406030204" pitchFamily="18" charset="0"/>
+                                </a:rPr>
+                                <m:t>𝑟</m:t>
+                              </m:r>
+                            </m:e>
+                            <m:sub>
+                              <m:r>
+                                <a:rPr lang="en-US" altLang="zh-CN" sz="2000" b="0" i="1" smtClean="0">
+                                  <a:latin typeface="Cambria Math" panose="02040503050406030204" pitchFamily="18" charset="0"/>
+                                </a:rPr>
+                                <m:t>𝑖</m:t>
+                              </m:r>
+                            </m:sub>
+                          </m:sSub>
+                          <m:r>
+                            <a:rPr lang="en-US" altLang="zh-CN" sz="2000" b="0" i="1" smtClean="0">
+                              <a:latin typeface="Cambria Math" panose="02040503050406030204" pitchFamily="18" charset="0"/>
+                            </a:rPr>
+                            <m:t>∗</m:t>
+                          </m:r>
+                          <m:sSub>
+                            <m:sSubPr>
+                              <m:ctrlPr>
+                                <a:rPr lang="en-US" altLang="zh-CN" sz="2000" b="0" i="1" smtClean="0">
+                                  <a:latin typeface="Cambria Math" panose="02040503050406030204" pitchFamily="18" charset="0"/>
+                                </a:rPr>
+                              </m:ctrlPr>
+                            </m:sSubPr>
+                            <m:e>
+                              <m:r>
+                                <a:rPr lang="en-US" altLang="zh-CN" sz="2000" b="0" i="1" smtClean="0">
+                                  <a:latin typeface="Cambria Math" panose="02040503050406030204" pitchFamily="18" charset="0"/>
+                                </a:rPr>
+                                <m:t>𝑎</m:t>
+                              </m:r>
+                            </m:e>
+                            <m:sub>
+                              <m:r>
+                                <a:rPr lang="en-US" altLang="zh-CN" sz="2000" b="0" i="1" smtClean="0">
+                                  <a:latin typeface="Cambria Math" panose="02040503050406030204" pitchFamily="18" charset="0"/>
+                                </a:rPr>
+                                <m:t>𝑖</m:t>
+                              </m:r>
+                            </m:sub>
+                          </m:sSub>
+                        </m:e>
+                      </m:d>
+                      <m:r>
+                        <a:rPr lang="en-US" altLang="zh-CN" sz="2000" b="0" i="0" smtClean="0">
+                          <a:latin typeface="Cambria Math" panose="02040503050406030204" pitchFamily="18" charset="0"/>
+                        </a:rPr>
+                        <m:t>∗</m:t>
+                      </m:r>
+                      <m:sSub>
+                        <m:sSubPr>
+                          <m:ctrlPr>
+                            <a:rPr lang="en-US" altLang="zh-CN" sz="2000" b="0" i="1" smtClean="0">
+                              <a:latin typeface="Cambria Math" panose="02040503050406030204" pitchFamily="18" charset="0"/>
+                            </a:rPr>
+                          </m:ctrlPr>
+                        </m:sSubPr>
+                        <m:e>
+                          <m:r>
+                            <m:rPr>
+                              <m:sty m:val="p"/>
+                            </m:rPr>
+                            <a:rPr lang="en-US" altLang="zh-CN" sz="2000" b="0" i="0" smtClean="0">
+                              <a:latin typeface="Cambria Math" panose="02040503050406030204" pitchFamily="18" charset="0"/>
+                            </a:rPr>
+                            <m:t>S</m:t>
+                          </m:r>
+                        </m:e>
+                        <m:sub>
+                          <m:r>
+                            <m:rPr>
+                              <m:sty m:val="p"/>
+                            </m:rPr>
+                            <a:rPr lang="en-US" altLang="zh-CN" sz="2000" b="0" i="0" smtClean="0">
+                              <a:latin typeface="Cambria Math" panose="02040503050406030204" pitchFamily="18" charset="0"/>
+                            </a:rPr>
+                            <m:t>i</m:t>
+                          </m:r>
+                        </m:sub>
+                      </m:sSub>
+                      <m:r>
+                        <a:rPr lang="en-US" altLang="zh-CN" sz="2000" b="0" i="0" smtClean="0">
+                          <a:latin typeface="Cambria Math" panose="02040503050406030204" pitchFamily="18" charset="0"/>
+                        </a:rPr>
+                        <m:t>(</m:t>
+                      </m:r>
+                      <m:sSub>
+                        <m:sSubPr>
+                          <m:ctrlPr>
+                            <a:rPr lang="en-US" altLang="zh-CN" sz="2000" b="0" i="1" smtClean="0">
+                              <a:latin typeface="Cambria Math" panose="02040503050406030204" pitchFamily="18" charset="0"/>
+                            </a:rPr>
+                          </m:ctrlPr>
+                        </m:sSubPr>
+                        <m:e>
+                          <m:r>
+                            <m:rPr>
+                              <m:sty m:val="p"/>
+                            </m:rPr>
+                            <a:rPr lang="en-US" altLang="zh-CN" sz="2000" b="0" i="0" smtClean="0">
+                              <a:latin typeface="Cambria Math" panose="02040503050406030204" pitchFamily="18" charset="0"/>
+                            </a:rPr>
+                            <m:t>c</m:t>
+                          </m:r>
+                        </m:e>
+                        <m:sub>
+                          <m:r>
+                            <a:rPr lang="en-US" altLang="zh-CN" sz="2000" b="0" i="0" smtClean="0">
+                              <a:latin typeface="Cambria Math" panose="02040503050406030204" pitchFamily="18" charset="0"/>
+                            </a:rPr>
+                            <m:t>1</m:t>
+                          </m:r>
+                        </m:sub>
+                      </m:sSub>
+                      <m:sSub>
+                        <m:sSubPr>
+                          <m:ctrlPr>
+                            <a:rPr lang="en-US" altLang="zh-CN" sz="2000" b="0" i="1" smtClean="0">
+                              <a:latin typeface="Cambria Math" panose="02040503050406030204" pitchFamily="18" charset="0"/>
+                            </a:rPr>
+                          </m:ctrlPr>
+                        </m:sSubPr>
+                        <m:e>
+                          <m:r>
+                            <m:rPr>
+                              <m:sty m:val="p"/>
+                            </m:rPr>
+                            <a:rPr lang="en-US" altLang="zh-CN" sz="2000" b="0" i="0" smtClean="0">
+                              <a:latin typeface="Cambria Math" panose="02040503050406030204" pitchFamily="18" charset="0"/>
+                            </a:rPr>
+                            <m:t>a</m:t>
+                          </m:r>
+                        </m:e>
+                        <m:sub>
+                          <m:r>
+                            <m:rPr>
+                              <m:sty m:val="p"/>
+                            </m:rPr>
+                            <a:rPr lang="en-US" altLang="zh-CN" sz="2000" b="0" i="0" smtClean="0">
+                              <a:latin typeface="Cambria Math" panose="02040503050406030204" pitchFamily="18" charset="0"/>
+                            </a:rPr>
+                            <m:t>e</m:t>
+                          </m:r>
+                        </m:sub>
+                      </m:sSub>
+                      <m:r>
+                        <a:rPr lang="en-US" altLang="zh-CN" sz="2000" b="0" i="0" smtClean="0">
+                          <a:latin typeface="Cambria Math" panose="02040503050406030204" pitchFamily="18" charset="0"/>
+                        </a:rPr>
+                        <m:t>−</m:t>
+                      </m:r>
+                      <m:sSub>
+                        <m:sSubPr>
+                          <m:ctrlPr>
+                            <a:rPr lang="en-US" altLang="zh-CN" sz="2000" b="0" i="1" smtClean="0">
+                              <a:latin typeface="Cambria Math" panose="02040503050406030204" pitchFamily="18" charset="0"/>
+                            </a:rPr>
+                          </m:ctrlPr>
+                        </m:sSubPr>
+                        <m:e>
+                          <m:r>
+                            <m:rPr>
+                              <m:sty m:val="p"/>
+                            </m:rPr>
+                            <a:rPr lang="en-US" altLang="zh-CN" sz="2000" b="0" i="0" smtClean="0">
+                              <a:latin typeface="Cambria Math" panose="02040503050406030204" pitchFamily="18" charset="0"/>
+                            </a:rPr>
+                            <m:t>c</m:t>
+                          </m:r>
+                        </m:e>
+                        <m:sub>
+                          <m:r>
+                            <a:rPr lang="en-US" altLang="zh-CN" sz="2000" b="0" i="0" smtClean="0">
+                              <a:latin typeface="Cambria Math" panose="02040503050406030204" pitchFamily="18" charset="0"/>
+                            </a:rPr>
+                            <m:t>2</m:t>
+                          </m:r>
+                        </m:sub>
+                      </m:sSub>
+                      <m:sSub>
+                        <m:sSubPr>
+                          <m:ctrlPr>
+                            <a:rPr lang="en-US" altLang="zh-CN" sz="2000" b="0" i="1" smtClean="0">
+                              <a:latin typeface="Cambria Math" panose="02040503050406030204" pitchFamily="18" charset="0"/>
+                            </a:rPr>
+                          </m:ctrlPr>
+                        </m:sSubPr>
+                        <m:e>
+                          <m:r>
+                            <m:rPr>
+                              <m:sty m:val="p"/>
+                            </m:rPr>
+                            <a:rPr lang="en-US" altLang="zh-CN" sz="2000" b="0" i="0" smtClean="0">
+                              <a:latin typeface="Cambria Math" panose="02040503050406030204" pitchFamily="18" charset="0"/>
+                            </a:rPr>
+                            <m:t>a</m:t>
+                          </m:r>
+                        </m:e>
+                        <m:sub>
+                          <m:r>
+                            <m:rPr>
+                              <m:sty m:val="p"/>
+                            </m:rPr>
+                            <a:rPr lang="en-US" altLang="zh-CN" sz="2000" b="0" i="0" smtClean="0">
+                              <a:latin typeface="Cambria Math" panose="02040503050406030204" pitchFamily="18" charset="0"/>
+                            </a:rPr>
+                            <m:t>i</m:t>
+                          </m:r>
+                        </m:sub>
+                      </m:sSub>
+                      <m:r>
+                        <a:rPr lang="en-US" altLang="zh-CN" sz="2000" b="0" i="0" smtClean="0">
+                          <a:latin typeface="Cambria Math" panose="02040503050406030204" pitchFamily="18" charset="0"/>
+                        </a:rPr>
+                        <m:t>+</m:t>
+                      </m:r>
+                      <m:sSub>
+                        <m:sSubPr>
+                          <m:ctrlPr>
+                            <a:rPr lang="en-US" altLang="zh-CN" sz="2000" b="0" i="1" smtClean="0">
+                              <a:latin typeface="Cambria Math" panose="02040503050406030204" pitchFamily="18" charset="0"/>
+                            </a:rPr>
+                          </m:ctrlPr>
+                        </m:sSubPr>
+                        <m:e>
+                          <m:sSub>
+                            <m:sSubPr>
+                              <m:ctrlPr>
+                                <a:rPr lang="en-US" altLang="zh-CN" sz="2000" b="0" i="1" smtClean="0">
+                                  <a:latin typeface="Cambria Math" panose="02040503050406030204" pitchFamily="18" charset="0"/>
+                                </a:rPr>
+                              </m:ctrlPr>
+                            </m:sSubPr>
+                            <m:e>
+                              <m:r>
+                                <m:rPr>
+                                  <m:sty m:val="p"/>
+                                </m:rPr>
+                                <a:rPr lang="en-US" altLang="zh-CN" sz="2000" b="0" i="0" smtClean="0">
+                                  <a:latin typeface="Cambria Math" panose="02040503050406030204" pitchFamily="18" charset="0"/>
+                                </a:rPr>
+                                <m:t>I</m:t>
+                              </m:r>
+                            </m:e>
+                            <m:sub>
+                              <m:r>
+                                <m:rPr>
+                                  <m:sty m:val="p"/>
+                                </m:rPr>
+                                <a:rPr lang="en-US" altLang="zh-CN" sz="2000" b="0" i="0" smtClean="0">
+                                  <a:latin typeface="Cambria Math" panose="02040503050406030204" pitchFamily="18" charset="0"/>
+                                </a:rPr>
+                                <m:t>ext</m:t>
+                              </m:r>
+                            </m:sub>
+                          </m:sSub>
+                        </m:e>
+                        <m:sub>
+                          <m:r>
+                            <m:rPr>
+                              <m:sty m:val="p"/>
+                            </m:rPr>
+                            <a:rPr lang="en-US" altLang="zh-CN" sz="2000" b="0" i="0" smtClean="0">
+                              <a:latin typeface="Cambria Math" panose="02040503050406030204" pitchFamily="18" charset="0"/>
+                            </a:rPr>
+                            <m:t>i</m:t>
+                          </m:r>
+                        </m:sub>
+                      </m:sSub>
+                      <m:r>
+                        <a:rPr lang="en-US" altLang="zh-CN" sz="2000" b="0" i="0" smtClean="0">
+                          <a:latin typeface="Cambria Math" panose="02040503050406030204" pitchFamily="18" charset="0"/>
+                        </a:rPr>
+                        <m:t>)</m:t>
+                      </m:r>
+                    </m:oMath>
+                  </m:oMathPara>
+                </a14:m>
+                <a:endParaRPr lang="zh-CN" altLang="en-US" sz="2000" dirty="0"/>
+              </a:p>
+            </p:txBody>
+          </p:sp>
+        </mc:Choice>
+        <mc:Fallback xmlns="">
+          <p:sp>
+            <p:nvSpPr>
+              <p:cNvPr id="8" name="文本框 7">
+                <a:extLst>
+                  <a:ext uri="{FF2B5EF4-FFF2-40B4-BE49-F238E27FC236}">
+                    <a16:creationId xmlns:a16="http://schemas.microsoft.com/office/drawing/2014/main" id="{BCDF120E-F6DE-49A8-B4CF-C95B96C8A002}"/>
+                  </a:ext>
+                </a:extLst>
+              </p:cNvPr>
+              <p:cNvSpPr txBox="1">
+                <a:spLocks noRot="1" noChangeAspect="1" noMove="1" noResize="1" noEditPoints="1" noAdjustHandles="1" noChangeArrowheads="1" noChangeShapeType="1" noTextEdit="1"/>
+              </p:cNvSpPr>
+              <p:nvPr/>
+            </p:nvSpPr>
+            <p:spPr>
+              <a:xfrm>
+                <a:off x="7017507" y="11384916"/>
+                <a:ext cx="7107102" cy="676660"/>
+              </a:xfrm>
+              <a:prstGeom prst="rect">
+                <a:avLst/>
+              </a:prstGeom>
+              <a:blipFill>
+                <a:blip r:embed="rId5"/>
+                <a:stretch>
+                  <a:fillRect/>
+                </a:stretch>
+              </a:blipFill>
+            </p:spPr>
+            <p:txBody>
+              <a:bodyPr/>
+              <a:lstStyle/>
+              <a:p>
+                <a:r>
+                  <a:rPr lang="zh-CN" altLang="en-US">
+                    <a:noFill/>
+                  </a:rPr>
+                  <a:t> </a:t>
+                </a:r>
+              </a:p>
+            </p:txBody>
+          </p:sp>
+        </mc:Fallback>
+      </mc:AlternateContent>
+    </p:spTree>
+    <p:extLst>
+      <p:ext uri="{BB962C8B-B14F-4D97-AF65-F5344CB8AC3E}">
+        <p14:creationId xmlns:p14="http://schemas.microsoft.com/office/powerpoint/2010/main" val="1791518054"/>
+      </p:ext>
+    </p:extLst>
+  </p:cSld>
+  <p:clrMapOvr>
+    <a:masterClrMapping/>
+  </p:clrMapOvr>
+</p:sld>
+</file>
+
+<file path=ppt/slides/slide15.xml><?xml version="1.0" encoding="utf-8"?>
+<p:sld xmlns:a="http://schemas.openxmlformats.org/drawingml/2006/main" xmlns:r="http://schemas.openxmlformats.org/officeDocument/2006/relationships" xmlns:p="http://schemas.openxmlformats.org/presentationml/2006/main">
+  <p:cSld>
+    <p:spTree>
+      <p:nvGrpSpPr>
+        <p:cNvPr id="1" name=""/>
+        <p:cNvGrpSpPr/>
+        <p:nvPr/>
+      </p:nvGrpSpPr>
+      <p:grpSpPr>
+        <a:xfrm>
+          <a:off x="0" y="0"/>
+          <a:ext cx="0" cy="0"/>
+          <a:chOff x="0" y="0"/>
+          <a:chExt cx="0" cy="0"/>
+        </a:xfrm>
+      </p:grpSpPr>
+      <p:pic>
+        <p:nvPicPr>
+          <p:cNvPr id="3" name="图片 2">
+            <a:extLst>
+              <a:ext uri="{FF2B5EF4-FFF2-40B4-BE49-F238E27FC236}">
+                <a16:creationId xmlns:a16="http://schemas.microsoft.com/office/drawing/2014/main" id="{6001AE9D-C65F-4B1C-9659-4DEEF6B38340}"/>
+              </a:ext>
+            </a:extLst>
+          </p:cNvPr>
+          <p:cNvPicPr>
+            <a:picLocks noChangeAspect="1"/>
+          </p:cNvPicPr>
+          <p:nvPr/>
+        </p:nvPicPr>
+        <p:blipFill>
+          <a:blip r:embed="rId2">
+            <a:extLst>
+              <a:ext uri="{28A0092B-C50C-407E-A947-70E740481C1C}">
+                <a14:useLocalDpi xmlns:a14="http://schemas.microsoft.com/office/drawing/2010/main" val="0"/>
+              </a:ext>
+            </a:extLst>
+          </a:blip>
+          <a:stretch>
+            <a:fillRect/>
+          </a:stretch>
+        </p:blipFill>
+        <p:spPr>
+          <a:xfrm>
+            <a:off x="0" y="2365110"/>
+            <a:ext cx="10800000" cy="14731420"/>
+          </a:xfrm>
+          <a:prstGeom prst="rect">
+            <a:avLst/>
+          </a:prstGeom>
+        </p:spPr>
+      </p:pic>
+      <p:sp>
+        <p:nvSpPr>
+          <p:cNvPr id="4" name="标题 1">
+            <a:extLst>
+              <a:ext uri="{FF2B5EF4-FFF2-40B4-BE49-F238E27FC236}">
+                <a16:creationId xmlns:a16="http://schemas.microsoft.com/office/drawing/2014/main" id="{D0D7EB43-CE2E-44FA-BA33-88D7C319B0F4}"/>
+              </a:ext>
+            </a:extLst>
+          </p:cNvPr>
+          <p:cNvSpPr txBox="1">
+            <a:spLocks/>
+          </p:cNvSpPr>
+          <p:nvPr/>
+        </p:nvSpPr>
+        <p:spPr>
+          <a:xfrm>
+            <a:off x="942975" y="124632"/>
+            <a:ext cx="11792569" cy="1405447"/>
+          </a:xfrm>
+          <a:prstGeom prst="rect">
+            <a:avLst/>
+          </a:prstGeom>
+        </p:spPr>
+        <p:txBody>
+          <a:bodyPr vert="horz" lIns="91440" tIns="45720" rIns="91440" bIns="45720" rtlCol="0" anchor="ctr">
+            <a:normAutofit/>
+          </a:bodyPr>
+          <a:lstStyle>
+            <a:lvl1pPr algn="l" defTabSz="1371600" rtl="0" eaLnBrk="1" latinLnBrk="0" hangingPunct="1">
+              <a:lnSpc>
+                <a:spcPct val="90000"/>
+              </a:lnSpc>
+              <a:spcBef>
+                <a:spcPct val="0"/>
+              </a:spcBef>
+              <a:buNone/>
+              <a:defRPr sz="6600" kern="1200">
+                <a:solidFill>
+                  <a:schemeClr val="tx1"/>
+                </a:solidFill>
+                <a:latin typeface="+mj-lt"/>
+                <a:ea typeface="+mj-ea"/>
+                <a:cs typeface="+mj-cs"/>
+              </a:defRPr>
+            </a:lvl1pPr>
+          </a:lstStyle>
+          <a:p>
+            <a:r>
+              <a:rPr lang="en-US" altLang="zh-CN" dirty="0"/>
+              <a:t>Firing Rate Unit</a:t>
+            </a:r>
+            <a:endParaRPr lang="zh-CN" altLang="en-US" dirty="0"/>
+          </a:p>
+        </p:txBody>
+      </p:sp>
+      <p:sp>
+        <p:nvSpPr>
+          <p:cNvPr id="15" name="右大括号 14">
+            <a:extLst>
+              <a:ext uri="{FF2B5EF4-FFF2-40B4-BE49-F238E27FC236}">
+                <a16:creationId xmlns:a16="http://schemas.microsoft.com/office/drawing/2014/main" id="{164E9D67-7F13-44BB-85A8-CC34AECAB816}"/>
+              </a:ext>
+            </a:extLst>
+          </p:cNvPr>
+          <p:cNvSpPr/>
+          <p:nvPr/>
+        </p:nvSpPr>
+        <p:spPr>
+          <a:xfrm>
+            <a:off x="5943048" y="4044674"/>
+            <a:ext cx="216000" cy="5295899"/>
+          </a:xfrm>
+          <a:prstGeom prst="rightBrace">
+            <a:avLst/>
+          </a:prstGeom>
+        </p:spPr>
+        <p:style>
+          <a:lnRef idx="1">
+            <a:schemeClr val="dk1"/>
+          </a:lnRef>
+          <a:fillRef idx="0">
+            <a:schemeClr val="dk1"/>
+          </a:fillRef>
+          <a:effectRef idx="0">
+            <a:schemeClr val="dk1"/>
+          </a:effectRef>
+          <a:fontRef idx="minor">
+            <a:schemeClr val="tx1"/>
+          </a:fontRef>
+        </p:style>
+        <p:txBody>
+          <a:bodyPr rtlCol="0" anchor="ctr"/>
+          <a:lstStyle/>
+          <a:p>
+            <a:pPr algn="ctr"/>
+            <a:endParaRPr lang="zh-CN" altLang="en-US" sz="7200"/>
+          </a:p>
+        </p:txBody>
+      </p:sp>
+      <p:sp>
+        <p:nvSpPr>
+          <p:cNvPr id="16" name="文本框 15">
+            <a:extLst>
+              <a:ext uri="{FF2B5EF4-FFF2-40B4-BE49-F238E27FC236}">
+                <a16:creationId xmlns:a16="http://schemas.microsoft.com/office/drawing/2014/main" id="{67DFD694-8BDF-401E-A5E5-667B460C4453}"/>
+              </a:ext>
+            </a:extLst>
+          </p:cNvPr>
+          <p:cNvSpPr txBox="1"/>
+          <p:nvPr/>
+        </p:nvSpPr>
+        <p:spPr>
+          <a:xfrm>
+            <a:off x="6332450" y="6318576"/>
+            <a:ext cx="3474266" cy="707886"/>
+          </a:xfrm>
+          <a:prstGeom prst="rect">
+            <a:avLst/>
+          </a:prstGeom>
+          <a:noFill/>
+        </p:spPr>
+        <p:txBody>
+          <a:bodyPr wrap="square" rtlCol="0">
+            <a:spAutoFit/>
+          </a:bodyPr>
+          <a:lstStyle/>
+          <a:p>
+            <a:r>
+              <a:rPr lang="en-US" altLang="zh-CN" sz="2000" dirty="0"/>
+              <a:t>Model parameters saved as </a:t>
+            </a:r>
+          </a:p>
+          <a:p>
+            <a:r>
+              <a:rPr lang="en-US" altLang="zh-CN" sz="2000" dirty="0"/>
+              <a:t>floating point numbers.</a:t>
+            </a:r>
+            <a:endParaRPr lang="zh-CN" altLang="en-US" sz="2000" dirty="0"/>
+          </a:p>
+        </p:txBody>
+      </p:sp>
+      <p:sp>
+        <p:nvSpPr>
+          <p:cNvPr id="17" name="右大括号 16">
+            <a:extLst>
+              <a:ext uri="{FF2B5EF4-FFF2-40B4-BE49-F238E27FC236}">
+                <a16:creationId xmlns:a16="http://schemas.microsoft.com/office/drawing/2014/main" id="{E25B37C3-0B6C-4204-8F71-9178D641F7F6}"/>
+              </a:ext>
+            </a:extLst>
+          </p:cNvPr>
+          <p:cNvSpPr/>
+          <p:nvPr/>
+        </p:nvSpPr>
+        <p:spPr>
+          <a:xfrm>
+            <a:off x="7452229" y="10173399"/>
+            <a:ext cx="216000" cy="1379362"/>
+          </a:xfrm>
+          <a:prstGeom prst="rightBrace">
+            <a:avLst/>
+          </a:prstGeom>
+        </p:spPr>
+        <p:style>
+          <a:lnRef idx="1">
+            <a:schemeClr val="dk1"/>
+          </a:lnRef>
+          <a:fillRef idx="0">
+            <a:schemeClr val="dk1"/>
+          </a:fillRef>
+          <a:effectRef idx="0">
+            <a:schemeClr val="dk1"/>
+          </a:effectRef>
+          <a:fontRef idx="minor">
+            <a:schemeClr val="tx1"/>
+          </a:fontRef>
+        </p:style>
+        <p:txBody>
+          <a:bodyPr rtlCol="0" anchor="ctr"/>
+          <a:lstStyle/>
+          <a:p>
+            <a:pPr algn="ctr"/>
+            <a:endParaRPr lang="zh-CN" altLang="en-US" sz="7200"/>
+          </a:p>
+        </p:txBody>
+      </p:sp>
+      <p:sp>
+        <p:nvSpPr>
+          <p:cNvPr id="18" name="文本框 17">
+            <a:extLst>
+              <a:ext uri="{FF2B5EF4-FFF2-40B4-BE49-F238E27FC236}">
+                <a16:creationId xmlns:a16="http://schemas.microsoft.com/office/drawing/2014/main" id="{AFED8C2C-08AE-4AC0-990A-288E38497083}"/>
+              </a:ext>
+            </a:extLst>
+          </p:cNvPr>
+          <p:cNvSpPr txBox="1"/>
+          <p:nvPr/>
+        </p:nvSpPr>
+        <p:spPr>
+          <a:xfrm>
+            <a:off x="7843197" y="10502353"/>
+            <a:ext cx="3927037" cy="707886"/>
+          </a:xfrm>
+          <a:prstGeom prst="rect">
+            <a:avLst/>
+          </a:prstGeom>
+          <a:noFill/>
+        </p:spPr>
+        <p:txBody>
+          <a:bodyPr wrap="none" rtlCol="0">
+            <a:spAutoFit/>
+          </a:bodyPr>
+          <a:lstStyle/>
+          <a:p>
+            <a:r>
+              <a:rPr lang="en-US" altLang="zh-CN" sz="2000" dirty="0"/>
+              <a:t>Model variables saved as vectors of </a:t>
+            </a:r>
+          </a:p>
+          <a:p>
+            <a:r>
+              <a:rPr lang="en-US" altLang="zh-CN" sz="2000" dirty="0"/>
+              <a:t>floating point numbers.</a:t>
+            </a:r>
+            <a:endParaRPr lang="zh-CN" altLang="en-US" sz="2000" dirty="0"/>
+          </a:p>
+        </p:txBody>
+      </p:sp>
+      <p:sp>
+        <p:nvSpPr>
+          <p:cNvPr id="19" name="文本框 18">
+            <a:extLst>
+              <a:ext uri="{FF2B5EF4-FFF2-40B4-BE49-F238E27FC236}">
+                <a16:creationId xmlns:a16="http://schemas.microsoft.com/office/drawing/2014/main" id="{FAFC104F-F0EF-4339-B8F6-C347AA0352B1}"/>
+              </a:ext>
+            </a:extLst>
+          </p:cNvPr>
+          <p:cNvSpPr txBox="1"/>
+          <p:nvPr/>
+        </p:nvSpPr>
+        <p:spPr>
+          <a:xfrm>
+            <a:off x="8396438" y="11397011"/>
+            <a:ext cx="3839384" cy="1015663"/>
+          </a:xfrm>
+          <a:prstGeom prst="rect">
+            <a:avLst/>
+          </a:prstGeom>
+          <a:noFill/>
+        </p:spPr>
+        <p:txBody>
+          <a:bodyPr wrap="square" rtlCol="0">
+            <a:spAutoFit/>
+          </a:bodyPr>
+          <a:lstStyle/>
+          <a:p>
+            <a:r>
+              <a:rPr lang="en-US" altLang="zh-CN" sz="2000" dirty="0"/>
+              <a:t>Call `bp.odeint` to integrate ODEs.</a:t>
+            </a:r>
+          </a:p>
+          <a:p>
+            <a:r>
+              <a:rPr lang="en-US" altLang="zh-CN" sz="2000" dirty="0"/>
+              <a:t>Parameter `method` is set to default value `</a:t>
+            </a:r>
+            <a:r>
+              <a:rPr lang="en-US" altLang="zh-CN" sz="2000" dirty="0" err="1"/>
+              <a:t>euler</a:t>
+            </a:r>
+            <a:r>
+              <a:rPr lang="en-US" altLang="zh-CN" sz="2000" dirty="0"/>
+              <a:t>`.</a:t>
+            </a:r>
+            <a:endParaRPr lang="zh-CN" altLang="en-US" sz="2000" dirty="0"/>
+          </a:p>
+        </p:txBody>
+      </p:sp>
+      <p:sp>
+        <p:nvSpPr>
+          <p:cNvPr id="20" name="文本框 19">
+            <a:extLst>
+              <a:ext uri="{FF2B5EF4-FFF2-40B4-BE49-F238E27FC236}">
+                <a16:creationId xmlns:a16="http://schemas.microsoft.com/office/drawing/2014/main" id="{5B2232E7-881C-4C2B-AB6F-91ED0BEFAA1E}"/>
+              </a:ext>
+            </a:extLst>
+          </p:cNvPr>
+          <p:cNvSpPr txBox="1"/>
+          <p:nvPr/>
+        </p:nvSpPr>
+        <p:spPr>
+          <a:xfrm>
+            <a:off x="8396438" y="12753906"/>
+            <a:ext cx="4005071" cy="707886"/>
+          </a:xfrm>
+          <a:prstGeom prst="rect">
+            <a:avLst/>
+          </a:prstGeom>
+          <a:noFill/>
+        </p:spPr>
+        <p:txBody>
+          <a:bodyPr wrap="square" rtlCol="0">
+            <a:spAutoFit/>
+          </a:bodyPr>
+          <a:lstStyle/>
+          <a:p>
+            <a:r>
+              <a:rPr lang="en-US" altLang="zh-CN" sz="2000" dirty="0"/>
+              <a:t>Pass `size` and `**kwargs` to </a:t>
+            </a:r>
+          </a:p>
+          <a:p>
+            <a:r>
+              <a:rPr lang="en-US" altLang="zh-CN" sz="2000" dirty="0"/>
+              <a:t>superclass bp.NeuGroup’s constrctor.</a:t>
+            </a:r>
+            <a:endParaRPr lang="zh-CN" altLang="en-US" sz="2000" dirty="0"/>
+          </a:p>
+        </p:txBody>
+      </p:sp>
+      <p:cxnSp>
+        <p:nvCxnSpPr>
+          <p:cNvPr id="21" name="直接箭头连接符 20">
+            <a:extLst>
+              <a:ext uri="{FF2B5EF4-FFF2-40B4-BE49-F238E27FC236}">
+                <a16:creationId xmlns:a16="http://schemas.microsoft.com/office/drawing/2014/main" id="{46CDB272-48E8-46D8-AFEB-B88E1CA182B9}"/>
+              </a:ext>
+            </a:extLst>
+          </p:cNvPr>
+          <p:cNvCxnSpPr>
+            <a:cxnSpLocks/>
+          </p:cNvCxnSpPr>
+          <p:nvPr/>
+        </p:nvCxnSpPr>
+        <p:spPr>
+          <a:xfrm>
+            <a:off x="7027545" y="12156438"/>
+            <a:ext cx="1325677" cy="0"/>
+          </a:xfrm>
+          <a:prstGeom prst="straightConnector1">
+            <a:avLst/>
+          </a:prstGeom>
+          <a:ln>
+            <a:tailEnd type="triangle"/>
+          </a:ln>
+        </p:spPr>
+        <p:style>
+          <a:lnRef idx="1">
+            <a:schemeClr val="dk1"/>
+          </a:lnRef>
+          <a:fillRef idx="0">
+            <a:schemeClr val="dk1"/>
+          </a:fillRef>
+          <a:effectRef idx="0">
+            <a:schemeClr val="dk1"/>
+          </a:effectRef>
+          <a:fontRef idx="minor">
+            <a:schemeClr val="tx1"/>
+          </a:fontRef>
+        </p:style>
+      </p:cxnSp>
+      <p:cxnSp>
+        <p:nvCxnSpPr>
+          <p:cNvPr id="22" name="连接符: 肘形 21">
+            <a:extLst>
+              <a:ext uri="{FF2B5EF4-FFF2-40B4-BE49-F238E27FC236}">
+                <a16:creationId xmlns:a16="http://schemas.microsoft.com/office/drawing/2014/main" id="{A3E9E519-6C15-40BB-B548-40CEEA106CDA}"/>
+              </a:ext>
+            </a:extLst>
+          </p:cNvPr>
+          <p:cNvCxnSpPr>
+            <a:cxnSpLocks/>
+          </p:cNvCxnSpPr>
+          <p:nvPr/>
+        </p:nvCxnSpPr>
+        <p:spPr>
+          <a:xfrm>
+            <a:off x="6687073" y="12680767"/>
+            <a:ext cx="1666149" cy="272855"/>
+          </a:xfrm>
+          <a:prstGeom prst="bentConnector3">
+            <a:avLst>
+              <a:gd name="adj1" fmla="val -308"/>
+            </a:avLst>
+          </a:prstGeom>
+          <a:ln>
+            <a:tailEnd type="triangle"/>
+          </a:ln>
+        </p:spPr>
+        <p:style>
+          <a:lnRef idx="1">
+            <a:schemeClr val="dk1"/>
+          </a:lnRef>
+          <a:fillRef idx="0">
+            <a:schemeClr val="dk1"/>
+          </a:fillRef>
+          <a:effectRef idx="0">
+            <a:schemeClr val="dk1"/>
+          </a:effectRef>
+          <a:fontRef idx="minor">
+            <a:schemeClr val="tx1"/>
+          </a:fontRef>
+        </p:style>
+      </p:cxnSp>
+      <p:sp>
+        <p:nvSpPr>
+          <p:cNvPr id="23" name="文本框 22">
+            <a:extLst>
+              <a:ext uri="{FF2B5EF4-FFF2-40B4-BE49-F238E27FC236}">
+                <a16:creationId xmlns:a16="http://schemas.microsoft.com/office/drawing/2014/main" id="{70A84DA6-F6F5-433E-B9A7-1D75B512923D}"/>
+              </a:ext>
+            </a:extLst>
+          </p:cNvPr>
+          <p:cNvSpPr txBox="1"/>
+          <p:nvPr/>
+        </p:nvSpPr>
+        <p:spPr>
+          <a:xfrm>
+            <a:off x="5276353" y="16388644"/>
+            <a:ext cx="2340192" cy="707886"/>
+          </a:xfrm>
+          <a:prstGeom prst="rect">
+            <a:avLst/>
+          </a:prstGeom>
+          <a:noFill/>
+        </p:spPr>
+        <p:txBody>
+          <a:bodyPr wrap="none" rtlCol="0">
+            <a:spAutoFit/>
+          </a:bodyPr>
+          <a:lstStyle/>
+          <a:p>
+            <a:r>
+              <a:rPr lang="en-US" altLang="zh-CN" sz="2000" dirty="0"/>
+              <a:t>Reset external input </a:t>
+            </a:r>
+          </a:p>
+          <a:p>
+            <a:r>
+              <a:rPr lang="en-US" altLang="zh-CN" sz="2000" dirty="0"/>
+              <a:t>for this time step.</a:t>
+            </a:r>
+            <a:endParaRPr lang="zh-CN" altLang="en-US" sz="2000" dirty="0"/>
+          </a:p>
+        </p:txBody>
+      </p:sp>
+      <p:sp>
+        <p:nvSpPr>
+          <p:cNvPr id="24" name="文本框 23">
+            <a:extLst>
+              <a:ext uri="{FF2B5EF4-FFF2-40B4-BE49-F238E27FC236}">
+                <a16:creationId xmlns:a16="http://schemas.microsoft.com/office/drawing/2014/main" id="{BBF5C5C2-659A-4219-91B9-4BBB106924C8}"/>
+              </a:ext>
+            </a:extLst>
+          </p:cNvPr>
+          <p:cNvSpPr txBox="1"/>
+          <p:nvPr/>
+        </p:nvSpPr>
+        <p:spPr>
+          <a:xfrm>
+            <a:off x="7881237" y="14374799"/>
+            <a:ext cx="2519344" cy="1015663"/>
+          </a:xfrm>
+          <a:prstGeom prst="rect">
+            <a:avLst/>
+          </a:prstGeom>
+          <a:noFill/>
+        </p:spPr>
+        <p:txBody>
+          <a:bodyPr wrap="none" rtlCol="0">
+            <a:spAutoFit/>
+          </a:bodyPr>
+          <a:lstStyle/>
+          <a:p>
+            <a:r>
+              <a:rPr lang="en-US" altLang="zh-CN" sz="2000" dirty="0"/>
+              <a:t>Update variables with </a:t>
+            </a:r>
+          </a:p>
+          <a:p>
+            <a:r>
+              <a:rPr lang="en-US" altLang="zh-CN" sz="2000" dirty="0"/>
+              <a:t>numerical integration</a:t>
+            </a:r>
+          </a:p>
+          <a:p>
+            <a:r>
+              <a:rPr lang="en-US" altLang="zh-CN" sz="2000" dirty="0"/>
+              <a:t>in vector form.</a:t>
+            </a:r>
+            <a:endParaRPr lang="zh-CN" altLang="en-US" sz="2000" dirty="0"/>
+          </a:p>
+        </p:txBody>
+      </p:sp>
+      <p:sp>
+        <p:nvSpPr>
+          <p:cNvPr id="27" name="右大括号 26">
+            <a:extLst>
+              <a:ext uri="{FF2B5EF4-FFF2-40B4-BE49-F238E27FC236}">
+                <a16:creationId xmlns:a16="http://schemas.microsoft.com/office/drawing/2014/main" id="{8922FC75-21BF-43C5-8685-08480EC8A780}"/>
+              </a:ext>
+            </a:extLst>
+          </p:cNvPr>
+          <p:cNvSpPr/>
+          <p:nvPr/>
+        </p:nvSpPr>
+        <p:spPr>
+          <a:xfrm>
+            <a:off x="4800600" y="16414044"/>
+            <a:ext cx="216000" cy="603956"/>
+          </a:xfrm>
+          <a:prstGeom prst="rightBrace">
+            <a:avLst/>
+          </a:prstGeom>
+        </p:spPr>
+        <p:style>
+          <a:lnRef idx="1">
+            <a:schemeClr val="dk1"/>
+          </a:lnRef>
+          <a:fillRef idx="0">
+            <a:schemeClr val="dk1"/>
+          </a:fillRef>
+          <a:effectRef idx="0">
+            <a:schemeClr val="dk1"/>
+          </a:effectRef>
+          <a:fontRef idx="minor">
+            <a:schemeClr val="tx1"/>
+          </a:fontRef>
+        </p:style>
+        <p:txBody>
+          <a:bodyPr rtlCol="0" anchor="ctr"/>
+          <a:lstStyle/>
+          <a:p>
+            <a:pPr algn="ctr"/>
+            <a:endParaRPr lang="zh-CN" altLang="en-US"/>
+          </a:p>
+        </p:txBody>
+      </p:sp>
+      <p:sp>
+        <p:nvSpPr>
+          <p:cNvPr id="28" name="右大括号 27">
+            <a:extLst>
+              <a:ext uri="{FF2B5EF4-FFF2-40B4-BE49-F238E27FC236}">
+                <a16:creationId xmlns:a16="http://schemas.microsoft.com/office/drawing/2014/main" id="{D6620FE1-C23B-4C77-939B-86EC9E97319B}"/>
+              </a:ext>
+            </a:extLst>
+          </p:cNvPr>
+          <p:cNvSpPr/>
+          <p:nvPr/>
+        </p:nvSpPr>
+        <p:spPr>
+          <a:xfrm>
+            <a:off x="7452228" y="13477950"/>
+            <a:ext cx="216000" cy="2727250"/>
+          </a:xfrm>
+          <a:prstGeom prst="rightBrace">
+            <a:avLst/>
+          </a:prstGeom>
+        </p:spPr>
+        <p:style>
+          <a:lnRef idx="1">
+            <a:schemeClr val="dk1"/>
+          </a:lnRef>
+          <a:fillRef idx="0">
+            <a:schemeClr val="dk1"/>
+          </a:fillRef>
+          <a:effectRef idx="0">
+            <a:schemeClr val="dk1"/>
+          </a:effectRef>
+          <a:fontRef idx="minor">
+            <a:schemeClr val="tx1"/>
+          </a:fontRef>
+        </p:style>
+        <p:txBody>
+          <a:bodyPr rtlCol="0" anchor="ctr"/>
+          <a:lstStyle/>
+          <a:p>
+            <a:pPr algn="ctr"/>
+            <a:endParaRPr lang="zh-CN" altLang="en-US"/>
+          </a:p>
+        </p:txBody>
+      </p:sp>
+    </p:spTree>
+    <p:extLst>
+      <p:ext uri="{BB962C8B-B14F-4D97-AF65-F5344CB8AC3E}">
+        <p14:creationId xmlns:p14="http://schemas.microsoft.com/office/powerpoint/2010/main" val="3745317330"/>
+      </p:ext>
+    </p:extLst>
+  </p:cSld>
+  <p:clrMapOvr>
+    <a:masterClrMapping/>
+  </p:clrMapOvr>
+</p:sld>
+</file>
+
 <file path=ppt/slides/slide2.xml><?xml version="1.0" encoding="utf-8"?>
 <p:sld xmlns:a="http://schemas.openxmlformats.org/drawingml/2006/main" xmlns:r="http://schemas.openxmlformats.org/officeDocument/2006/relationships" xmlns:p="http://schemas.openxmlformats.org/presentationml/2006/main">
   <p:cSld>
@@ -11682,8 +14519,8 @@
           </a:p>
         </p:txBody>
       </p:sp>
-      <mc:AlternateContent xmlns:mc="http://schemas.openxmlformats.org/markup-compatibility/2006">
-        <mc:Choice xmlns:a14="http://schemas.microsoft.com/office/drawing/2010/main" Requires="a14">
+      <mc:AlternateContent xmlns:mc="http://schemas.openxmlformats.org/markup-compatibility/2006" xmlns:a14="http://schemas.microsoft.com/office/drawing/2010/main">
+        <mc:Choice Requires="a14">
           <p:sp>
             <p:nvSpPr>
               <p:cNvPr id="11" name="文本框 10">
@@ -11935,7 +14772,7 @@
             </p:txBody>
           </p:sp>
         </mc:Choice>
-        <mc:Fallback>
+        <mc:Fallback xmlns="">
           <p:sp>
             <p:nvSpPr>
               <p:cNvPr id="11" name="文本框 10">

</xml_diff>

<commit_message>
Transfer en PPT to zh
</commit_message>
<xml_diff>
--- a/docs/brainpy_handbook/ppt/neus.pptx
+++ b/docs/brainpy_handbook/ppt/neus.pptx
@@ -257,7 +257,7 @@
           <a:p>
             <a:fld id="{0E88AB90-0D2D-461D-B22C-FF3F8B460DB8}" type="datetimeFigureOut">
               <a:rPr lang="zh-CN" altLang="en-US" smtClean="0"/>
-              <a:t>2021/4/29</a:t>
+              <a:t>2021/5/11</a:t>
             </a:fld>
             <a:endParaRPr lang="zh-CN" altLang="en-US"/>
           </a:p>
@@ -427,7 +427,7 @@
           <a:p>
             <a:fld id="{0E88AB90-0D2D-461D-B22C-FF3F8B460DB8}" type="datetimeFigureOut">
               <a:rPr lang="zh-CN" altLang="en-US" smtClean="0"/>
-              <a:t>2021/4/29</a:t>
+              <a:t>2021/5/11</a:t>
             </a:fld>
             <a:endParaRPr lang="zh-CN" altLang="en-US"/>
           </a:p>
@@ -607,7 +607,7 @@
           <a:p>
             <a:fld id="{0E88AB90-0D2D-461D-B22C-FF3F8B460DB8}" type="datetimeFigureOut">
               <a:rPr lang="zh-CN" altLang="en-US" smtClean="0"/>
-              <a:t>2021/4/29</a:t>
+              <a:t>2021/5/11</a:t>
             </a:fld>
             <a:endParaRPr lang="zh-CN" altLang="en-US"/>
           </a:p>
@@ -777,7 +777,7 @@
           <a:p>
             <a:fld id="{0E88AB90-0D2D-461D-B22C-FF3F8B460DB8}" type="datetimeFigureOut">
               <a:rPr lang="zh-CN" altLang="en-US" smtClean="0"/>
-              <a:t>2021/4/29</a:t>
+              <a:t>2021/5/11</a:t>
             </a:fld>
             <a:endParaRPr lang="zh-CN" altLang="en-US"/>
           </a:p>
@@ -1021,7 +1021,7 @@
           <a:p>
             <a:fld id="{0E88AB90-0D2D-461D-B22C-FF3F8B460DB8}" type="datetimeFigureOut">
               <a:rPr lang="zh-CN" altLang="en-US" smtClean="0"/>
-              <a:t>2021/4/29</a:t>
+              <a:t>2021/5/11</a:t>
             </a:fld>
             <a:endParaRPr lang="zh-CN" altLang="en-US"/>
           </a:p>
@@ -1253,7 +1253,7 @@
           <a:p>
             <a:fld id="{0E88AB90-0D2D-461D-B22C-FF3F8B460DB8}" type="datetimeFigureOut">
               <a:rPr lang="zh-CN" altLang="en-US" smtClean="0"/>
-              <a:t>2021/4/29</a:t>
+              <a:t>2021/5/11</a:t>
             </a:fld>
             <a:endParaRPr lang="zh-CN" altLang="en-US"/>
           </a:p>
@@ -1620,7 +1620,7 @@
           <a:p>
             <a:fld id="{0E88AB90-0D2D-461D-B22C-FF3F8B460DB8}" type="datetimeFigureOut">
               <a:rPr lang="zh-CN" altLang="en-US" smtClean="0"/>
-              <a:t>2021/4/29</a:t>
+              <a:t>2021/5/11</a:t>
             </a:fld>
             <a:endParaRPr lang="zh-CN" altLang="en-US"/>
           </a:p>
@@ -1738,7 +1738,7 @@
           <a:p>
             <a:fld id="{0E88AB90-0D2D-461D-B22C-FF3F8B460DB8}" type="datetimeFigureOut">
               <a:rPr lang="zh-CN" altLang="en-US" smtClean="0"/>
-              <a:t>2021/4/29</a:t>
+              <a:t>2021/5/11</a:t>
             </a:fld>
             <a:endParaRPr lang="zh-CN" altLang="en-US"/>
           </a:p>
@@ -1833,7 +1833,7 @@
           <a:p>
             <a:fld id="{0E88AB90-0D2D-461D-B22C-FF3F8B460DB8}" type="datetimeFigureOut">
               <a:rPr lang="zh-CN" altLang="en-US" smtClean="0"/>
-              <a:t>2021/4/29</a:t>
+              <a:t>2021/5/11</a:t>
             </a:fld>
             <a:endParaRPr lang="zh-CN" altLang="en-US"/>
           </a:p>
@@ -2110,7 +2110,7 @@
           <a:p>
             <a:fld id="{0E88AB90-0D2D-461D-B22C-FF3F8B460DB8}" type="datetimeFigureOut">
               <a:rPr lang="zh-CN" altLang="en-US" smtClean="0"/>
-              <a:t>2021/4/29</a:t>
+              <a:t>2021/5/11</a:t>
             </a:fld>
             <a:endParaRPr lang="zh-CN" altLang="en-US"/>
           </a:p>
@@ -2367,7 +2367,7 @@
           <a:p>
             <a:fld id="{0E88AB90-0D2D-461D-B22C-FF3F8B460DB8}" type="datetimeFigureOut">
               <a:rPr lang="zh-CN" altLang="en-US" smtClean="0"/>
-              <a:t>2021/4/29</a:t>
+              <a:t>2021/5/11</a:t>
             </a:fld>
             <a:endParaRPr lang="zh-CN" altLang="en-US"/>
           </a:p>
@@ -2580,7 +2580,7 @@
           <a:p>
             <a:fld id="{0E88AB90-0D2D-461D-B22C-FF3F8B460DB8}" type="datetimeFigureOut">
               <a:rPr lang="zh-CN" altLang="en-US" smtClean="0"/>
-              <a:t>2021/4/29</a:t>
+              <a:t>2021/5/11</a:t>
             </a:fld>
             <a:endParaRPr lang="zh-CN" altLang="en-US"/>
           </a:p>
@@ -13676,54 +13676,6 @@
           </a:p>
         </p:txBody>
       </p:sp>
-      <p:sp>
-        <p:nvSpPr>
-          <p:cNvPr id="21" name="文本框 20">
-            <a:extLst>
-              <a:ext uri="{FF2B5EF4-FFF2-40B4-BE49-F238E27FC236}">
-                <a16:creationId xmlns:a16="http://schemas.microsoft.com/office/drawing/2014/main" id="{4C237611-F860-4DFB-BE0D-9F56F7FCEF35}"/>
-              </a:ext>
-            </a:extLst>
-          </p:cNvPr>
-          <p:cNvSpPr txBox="1"/>
-          <p:nvPr/>
-        </p:nvSpPr>
-        <p:spPr>
-          <a:xfrm>
-            <a:off x="8896160" y="11311817"/>
-            <a:ext cx="3839384" cy="1015663"/>
-          </a:xfrm>
-          <a:prstGeom prst="rect">
-            <a:avLst/>
-          </a:prstGeom>
-          <a:noFill/>
-        </p:spPr>
-        <p:txBody>
-          <a:bodyPr wrap="square" rtlCol="0">
-            <a:spAutoFit/>
-          </a:bodyPr>
-          <a:lstStyle/>
-          <a:p>
-            <a:r>
-              <a:rPr lang="en-US" altLang="zh-CN" sz="2000" dirty="0"/>
-              <a:t>Call `bp.odeint` to integrate ODEs.</a:t>
-            </a:r>
-          </a:p>
-          <a:p>
-            <a:r>
-              <a:rPr lang="en-US" altLang="zh-CN" sz="2000" dirty="0"/>
-              <a:t>Set parameter `method` to choose </a:t>
-            </a:r>
-          </a:p>
-          <a:p>
-            <a:r>
-              <a:rPr lang="en-US" altLang="zh-CN" sz="2000" dirty="0"/>
-              <a:t>numerical integration methods.</a:t>
-            </a:r>
-            <a:endParaRPr lang="zh-CN" altLang="en-US" sz="2000" dirty="0"/>
-          </a:p>
-        </p:txBody>
-      </p:sp>
       <p:cxnSp>
         <p:nvCxnSpPr>
           <p:cNvPr id="22" name="直接箭头连接符 21">
@@ -14367,6 +14319,56 @@
               <a:t>LIF</a:t>
             </a:r>
             <a:endParaRPr lang="zh-CN" altLang="en-US" dirty="0"/>
+          </a:p>
+        </p:txBody>
+      </p:sp>
+      <p:sp>
+        <p:nvSpPr>
+          <p:cNvPr id="30" name="文本框 29">
+            <a:extLst>
+              <a:ext uri="{FF2B5EF4-FFF2-40B4-BE49-F238E27FC236}">
+                <a16:creationId xmlns:a16="http://schemas.microsoft.com/office/drawing/2014/main" id="{55D17628-03F8-4F04-868A-B03F9BF520C9}"/>
+              </a:ext>
+            </a:extLst>
+          </p:cNvPr>
+          <p:cNvSpPr txBox="1"/>
+          <p:nvPr/>
+        </p:nvSpPr>
+        <p:spPr>
+          <a:xfrm>
+            <a:off x="8808563" y="11286346"/>
+            <a:ext cx="3839384" cy="1015663"/>
+          </a:xfrm>
+          <a:prstGeom prst="rect">
+            <a:avLst/>
+          </a:prstGeom>
+          <a:noFill/>
+        </p:spPr>
+        <p:txBody>
+          <a:bodyPr wrap="square" rtlCol="0">
+            <a:spAutoFit/>
+          </a:bodyPr>
+          <a:lstStyle/>
+          <a:p>
+            <a:r>
+              <a:rPr lang="en-US" altLang="zh-CN" sz="2000" dirty="0"/>
+              <a:t>Call `bp.odeint` to integrate ODEs.</a:t>
+            </a:r>
+          </a:p>
+          <a:p>
+            <a:r>
+              <a:rPr lang="en-US" altLang="zh-CN" sz="2000" dirty="0"/>
+              <a:t>Parameter `method` is set to default value `</a:t>
+            </a:r>
+            <a:r>
+              <a:rPr lang="en-US" altLang="zh-CN" sz="2000" dirty="0" err="1"/>
+              <a:t>euler</a:t>
+            </a:r>
+            <a:r>
+              <a:rPr lang="en-US" altLang="zh-CN" sz="2000" dirty="0"/>
+              <a:t>`.</a:t>
+            </a:r>
+            <a:endParaRPr lang="zh-CN" altLang="en-US" sz="2000" dirty="0"/>
           </a:p>
         </p:txBody>
       </p:sp>

</xml_diff>